<commit_message>
Add test time, fix
</commit_message>
<xml_diff>
--- a/26.pptx
+++ b/26.pptx
@@ -15,9 +15,9 @@
     <p:sldId id="262" r:id="rId9"/>
     <p:sldId id="265" r:id="rId10"/>
     <p:sldId id="266" r:id="rId11"/>
-    <p:sldId id="267" r:id="rId12"/>
-    <p:sldId id="264" r:id="rId13"/>
-    <p:sldId id="268" r:id="rId14"/>
+    <p:sldId id="264" r:id="rId12"/>
+    <p:sldId id="268" r:id="rId13"/>
+    <p:sldId id="267" r:id="rId14"/>
     <p:sldId id="269" r:id="rId15"/>
     <p:sldId id="270" r:id="rId16"/>
   </p:sldIdLst>
@@ -341,7 +341,7 @@
             <a:fld id="{967F0ED5-C12A-41CE-AA56-1B07111EC181}" type="datetimeFigureOut">
               <a:rPr lang="ru-RU" smtClean="0"/>
               <a:pPr/>
-              <a:t>22.06.2020</a:t>
+              <a:t>23.06.2020</a:t>
             </a:fld>
             <a:endParaRPr lang="ru-RU"/>
           </a:p>
@@ -530,7 +530,7 @@
             <a:fld id="{967F0ED5-C12A-41CE-AA56-1B07111EC181}" type="datetimeFigureOut">
               <a:rPr lang="ru-RU" smtClean="0"/>
               <a:pPr/>
-              <a:t>22.06.2020</a:t>
+              <a:t>23.06.2020</a:t>
             </a:fld>
             <a:endParaRPr lang="ru-RU"/>
           </a:p>
@@ -707,7 +707,7 @@
             <a:fld id="{967F0ED5-C12A-41CE-AA56-1B07111EC181}" type="datetimeFigureOut">
               <a:rPr lang="ru-RU" smtClean="0"/>
               <a:pPr/>
-              <a:t>22.06.2020</a:t>
+              <a:t>23.06.2020</a:t>
             </a:fld>
             <a:endParaRPr lang="ru-RU"/>
           </a:p>
@@ -889,7 +889,7 @@
             <a:fld id="{967F0ED5-C12A-41CE-AA56-1B07111EC181}" type="datetimeFigureOut">
               <a:rPr lang="ru-RU" smtClean="0"/>
               <a:pPr/>
-              <a:t>22.06.2020</a:t>
+              <a:t>23.06.2020</a:t>
             </a:fld>
             <a:endParaRPr lang="ru-RU"/>
           </a:p>
@@ -1138,7 +1138,7 @@
             <a:fld id="{967F0ED5-C12A-41CE-AA56-1B07111EC181}" type="datetimeFigureOut">
               <a:rPr lang="ru-RU" smtClean="0"/>
               <a:pPr/>
-              <a:t>22.06.2020</a:t>
+              <a:t>23.06.2020</a:t>
             </a:fld>
             <a:endParaRPr lang="ru-RU"/>
           </a:p>
@@ -1614,7 +1614,7 @@
             <a:fld id="{967F0ED5-C12A-41CE-AA56-1B07111EC181}" type="datetimeFigureOut">
               <a:rPr lang="ru-RU" smtClean="0"/>
               <a:pPr/>
-              <a:t>22.06.2020</a:t>
+              <a:t>23.06.2020</a:t>
             </a:fld>
             <a:endParaRPr lang="ru-RU"/>
           </a:p>
@@ -2031,7 +2031,7 @@
             <a:fld id="{967F0ED5-C12A-41CE-AA56-1B07111EC181}" type="datetimeFigureOut">
               <a:rPr lang="ru-RU" smtClean="0"/>
               <a:pPr/>
-              <a:t>22.06.2020</a:t>
+              <a:t>23.06.2020</a:t>
             </a:fld>
             <a:endParaRPr lang="ru-RU"/>
           </a:p>
@@ -2164,7 +2164,7 @@
             <a:fld id="{967F0ED5-C12A-41CE-AA56-1B07111EC181}" type="datetimeFigureOut">
               <a:rPr lang="ru-RU" smtClean="0"/>
               <a:pPr/>
-              <a:t>22.06.2020</a:t>
+              <a:t>23.06.2020</a:t>
             </a:fld>
             <a:endParaRPr lang="ru-RU"/>
           </a:p>
@@ -2261,7 +2261,7 @@
             <a:fld id="{967F0ED5-C12A-41CE-AA56-1B07111EC181}" type="datetimeFigureOut">
               <a:rPr lang="ru-RU" smtClean="0"/>
               <a:pPr/>
-              <a:t>22.06.2020</a:t>
+              <a:t>23.06.2020</a:t>
             </a:fld>
             <a:endParaRPr lang="ru-RU"/>
           </a:p>
@@ -2541,7 +2541,7 @@
             <a:fld id="{967F0ED5-C12A-41CE-AA56-1B07111EC181}" type="datetimeFigureOut">
               <a:rPr lang="ru-RU" smtClean="0"/>
               <a:pPr/>
-              <a:t>22.06.2020</a:t>
+              <a:t>23.06.2020</a:t>
             </a:fld>
             <a:endParaRPr lang="ru-RU"/>
           </a:p>
@@ -2795,7 +2795,7 @@
             <a:fld id="{967F0ED5-C12A-41CE-AA56-1B07111EC181}" type="datetimeFigureOut">
               <a:rPr lang="ru-RU" smtClean="0"/>
               <a:pPr/>
-              <a:t>22.06.2020</a:t>
+              <a:t>23.06.2020</a:t>
             </a:fld>
             <a:endParaRPr lang="ru-RU"/>
           </a:p>
@@ -3169,7 +3169,7 @@
             <a:fld id="{967F0ED5-C12A-41CE-AA56-1B07111EC181}" type="datetimeFigureOut">
               <a:rPr lang="ru-RU" smtClean="0"/>
               <a:pPr/>
-              <a:t>22.06.2020</a:t>
+              <a:t>23.06.2020</a:t>
             </a:fld>
             <a:endParaRPr lang="ru-RU"/>
           </a:p>
@@ -3677,6 +3677,13 @@
   <p:clrMapOvr>
     <a:masterClrMapping/>
   </p:clrMapOvr>
+  <p:timing>
+    <p:tnLst>
+      <p:par>
+        <p:cTn id="1" dur="indefinite" restart="never" nodeType="tmRoot"/>
+      </p:par>
+    </p:tnLst>
+  </p:timing>
 </p:sld>
 </file>
 
@@ -3697,32 +3704,9 @@
           <a:chExt cx="0" cy="0"/>
         </a:xfrm>
       </p:grpSpPr>
-      <p:sp>
-        <p:nvSpPr>
-          <p:cNvPr id="2" name="Заголовок 1"/>
-          <p:cNvSpPr>
-            <a:spLocks noGrp="1"/>
-          </p:cNvSpPr>
-          <p:nvPr>
-            <p:ph type="title"/>
-          </p:nvPr>
-        </p:nvSpPr>
-        <p:spPr/>
-        <p:txBody>
-          <a:bodyPr/>
-          <a:lstStyle/>
-          <a:p>
-            <a:r>
-              <a:rPr lang="ru-RU" dirty="0" smtClean="0"/>
-              <a:t>Реализация поиска по префиксу</a:t>
-            </a:r>
-            <a:endParaRPr lang="ru-RU" dirty="0"/>
-          </a:p>
-        </p:txBody>
-      </p:sp>
       <p:pic>
         <p:nvPicPr>
-          <p:cNvPr id="2051" name="Picture 3"/>
+          <p:cNvPr id="3074" name="Picture 2"/>
           <p:cNvPicPr>
             <a:picLocks noChangeAspect="1" noChangeArrowheads="1"/>
           </p:cNvPicPr>
@@ -3737,401 +3721,413 @@
         </p:blipFill>
         <p:spPr bwMode="auto">
           <a:xfrm>
-            <a:off x="539552" y="2924944"/>
-            <a:ext cx="3960440" cy="1814784"/>
+            <a:off x="1547664" y="188640"/>
+            <a:ext cx="6041814" cy="6381328"/>
           </a:xfrm>
           <a:prstGeom prst="rect">
             <a:avLst/>
           </a:prstGeom>
-          <a:ln>
+          <a:noFill/>
+          <a:ln w="9525">
             <a:noFill/>
+            <a:miter lim="800000"/>
+            <a:headEnd/>
+            <a:tailEnd/>
           </a:ln>
-          <a:effectLst>
-            <a:outerShdw blurRad="292100" dist="139700" dir="2700000" algn="tl" rotWithShape="0">
-              <a:srgbClr val="333333">
-                <a:alpha val="65000"/>
-              </a:srgbClr>
-            </a:outerShdw>
-          </a:effectLst>
         </p:spPr>
       </p:pic>
-      <p:pic>
-        <p:nvPicPr>
-          <p:cNvPr id="2053" name="Picture 5"/>
-          <p:cNvPicPr>
-            <a:picLocks noChangeAspect="1" noChangeArrowheads="1"/>
-          </p:cNvPicPr>
+      <p:grpSp>
+        <p:nvGrpSpPr>
+          <p:cNvPr id="11" name="Группа 10"/>
+          <p:cNvGrpSpPr/>
           <p:nvPr/>
-        </p:nvPicPr>
-        <p:blipFill>
-          <a:blip r:embed="rId3" cstate="print"/>
-          <a:srcRect/>
-          <a:stretch>
-            <a:fillRect/>
-          </a:stretch>
-        </p:blipFill>
-        <p:spPr bwMode="auto">
+        </p:nvGrpSpPr>
+        <p:grpSpPr>
           <a:xfrm>
-            <a:off x="4644008" y="1772816"/>
-            <a:ext cx="4193778" cy="1733545"/>
+            <a:off x="539552" y="1772816"/>
+            <a:ext cx="8298234" cy="4548818"/>
+            <a:chOff x="539552" y="1772816"/>
+            <a:chExt cx="8298234" cy="4548818"/>
           </a:xfrm>
-          <a:prstGeom prst="rect">
-            <a:avLst/>
-          </a:prstGeom>
-          <a:ln>
-            <a:noFill/>
-          </a:ln>
-          <a:effectLst>
-            <a:outerShdw blurRad="292100" dist="139700" dir="2700000" algn="tl" rotWithShape="0">
-              <a:srgbClr val="333333">
-                <a:alpha val="65000"/>
-              </a:srgbClr>
-            </a:outerShdw>
-          </a:effectLst>
-        </p:spPr>
-      </p:pic>
-      <p:pic>
-        <p:nvPicPr>
-          <p:cNvPr id="2054" name="Picture 6"/>
-          <p:cNvPicPr>
-            <a:picLocks noChangeAspect="1" noChangeArrowheads="1"/>
-          </p:cNvPicPr>
-          <p:nvPr/>
-        </p:nvPicPr>
-        <p:blipFill>
-          <a:blip r:embed="rId4" cstate="print"/>
-          <a:srcRect/>
-          <a:stretch>
-            <a:fillRect/>
-          </a:stretch>
-        </p:blipFill>
-        <p:spPr bwMode="auto">
-          <a:xfrm>
-            <a:off x="5076056" y="3717032"/>
-            <a:ext cx="3344044" cy="2604602"/>
-          </a:xfrm>
-          <a:prstGeom prst="rect">
-            <a:avLst/>
-          </a:prstGeom>
-          <a:ln>
-            <a:noFill/>
-          </a:ln>
-          <a:effectLst>
-            <a:outerShdw blurRad="292100" dist="139700" dir="2700000" algn="tl" rotWithShape="0">
-              <a:srgbClr val="333333">
-                <a:alpha val="65000"/>
-              </a:srgbClr>
-            </a:outerShdw>
-          </a:effectLst>
-        </p:spPr>
-      </p:pic>
-      <p:cxnSp>
-        <p:nvCxnSpPr>
-          <p:cNvPr id="10" name="Прямая со стрелкой 9"/>
-          <p:cNvCxnSpPr/>
-          <p:nvPr/>
-        </p:nvCxnSpPr>
-        <p:spPr>
-          <a:xfrm flipV="1">
-            <a:off x="3491880" y="1988840"/>
-            <a:ext cx="1368152" cy="1656184"/>
-          </a:xfrm>
-          <a:prstGeom prst="straightConnector1">
-            <a:avLst/>
-          </a:prstGeom>
-          <a:ln w="28575">
-            <a:solidFill>
-              <a:srgbClr val="7030A0"/>
-            </a:solidFill>
-            <a:tailEnd type="arrow"/>
-          </a:ln>
-        </p:spPr>
-        <p:style>
-          <a:lnRef idx="1">
-            <a:schemeClr val="accent1"/>
-          </a:lnRef>
-          <a:fillRef idx="0">
-            <a:schemeClr val="accent1"/>
-          </a:fillRef>
-          <a:effectRef idx="0">
-            <a:schemeClr val="accent1"/>
-          </a:effectRef>
-          <a:fontRef idx="minor">
-            <a:schemeClr val="tx1"/>
-          </a:fontRef>
-        </p:style>
-      </p:cxnSp>
-      <p:cxnSp>
-        <p:nvCxnSpPr>
-          <p:cNvPr id="13" name="Прямая со стрелкой 12"/>
-          <p:cNvCxnSpPr/>
-          <p:nvPr/>
-        </p:nvCxnSpPr>
-        <p:spPr>
-          <a:xfrm>
-            <a:off x="2915816" y="4005064"/>
-            <a:ext cx="2376264" cy="504056"/>
-          </a:xfrm>
-          <a:prstGeom prst="straightConnector1">
-            <a:avLst/>
-          </a:prstGeom>
-          <a:ln w="28575">
-            <a:tailEnd type="arrow"/>
-          </a:ln>
-        </p:spPr>
-        <p:style>
-          <a:lnRef idx="1">
-            <a:schemeClr val="accent4"/>
-          </a:lnRef>
-          <a:fillRef idx="0">
-            <a:schemeClr val="accent4"/>
-          </a:fillRef>
-          <a:effectRef idx="0">
-            <a:schemeClr val="accent4"/>
-          </a:effectRef>
-          <a:fontRef idx="minor">
-            <a:schemeClr val="tx1"/>
-          </a:fontRef>
-        </p:style>
-      </p:cxnSp>
+        </p:grpSpPr>
+        <p:pic>
+          <p:nvPicPr>
+            <p:cNvPr id="2051" name="Picture 3"/>
+            <p:cNvPicPr>
+              <a:picLocks noChangeAspect="1" noChangeArrowheads="1"/>
+            </p:cNvPicPr>
+            <p:nvPr/>
+          </p:nvPicPr>
+          <p:blipFill>
+            <a:blip r:embed="rId3" cstate="print"/>
+            <a:srcRect/>
+            <a:stretch>
+              <a:fillRect/>
+            </a:stretch>
+          </p:blipFill>
+          <p:spPr bwMode="auto">
+            <a:xfrm>
+              <a:off x="539552" y="2924944"/>
+              <a:ext cx="3960440" cy="1814784"/>
+            </a:xfrm>
+            <a:prstGeom prst="rect">
+              <a:avLst/>
+            </a:prstGeom>
+            <a:ln>
+              <a:noFill/>
+            </a:ln>
+            <a:effectLst>
+              <a:outerShdw blurRad="292100" dist="139700" dir="2700000" algn="tl" rotWithShape="0">
+                <a:srgbClr val="333333">
+                  <a:alpha val="65000"/>
+                </a:srgbClr>
+              </a:outerShdw>
+            </a:effectLst>
+          </p:spPr>
+        </p:pic>
+        <p:pic>
+          <p:nvPicPr>
+            <p:cNvPr id="2053" name="Picture 5"/>
+            <p:cNvPicPr>
+              <a:picLocks noChangeAspect="1" noChangeArrowheads="1"/>
+            </p:cNvPicPr>
+            <p:nvPr/>
+          </p:nvPicPr>
+          <p:blipFill>
+            <a:blip r:embed="rId4" cstate="print"/>
+            <a:srcRect/>
+            <a:stretch>
+              <a:fillRect/>
+            </a:stretch>
+          </p:blipFill>
+          <p:spPr bwMode="auto">
+            <a:xfrm>
+              <a:off x="4644008" y="1772816"/>
+              <a:ext cx="4193778" cy="1733545"/>
+            </a:xfrm>
+            <a:prstGeom prst="rect">
+              <a:avLst/>
+            </a:prstGeom>
+            <a:ln>
+              <a:noFill/>
+            </a:ln>
+            <a:effectLst>
+              <a:outerShdw blurRad="292100" dist="139700" dir="2700000" algn="tl" rotWithShape="0">
+                <a:srgbClr val="333333">
+                  <a:alpha val="65000"/>
+                </a:srgbClr>
+              </a:outerShdw>
+            </a:effectLst>
+          </p:spPr>
+        </p:pic>
+        <p:pic>
+          <p:nvPicPr>
+            <p:cNvPr id="2054" name="Picture 6"/>
+            <p:cNvPicPr>
+              <a:picLocks noChangeAspect="1" noChangeArrowheads="1"/>
+            </p:cNvPicPr>
+            <p:nvPr/>
+          </p:nvPicPr>
+          <p:blipFill>
+            <a:blip r:embed="rId5" cstate="print"/>
+            <a:srcRect/>
+            <a:stretch>
+              <a:fillRect/>
+            </a:stretch>
+          </p:blipFill>
+          <p:spPr bwMode="auto">
+            <a:xfrm>
+              <a:off x="5076056" y="3717032"/>
+              <a:ext cx="3344044" cy="2604602"/>
+            </a:xfrm>
+            <a:prstGeom prst="rect">
+              <a:avLst/>
+            </a:prstGeom>
+            <a:ln>
+              <a:noFill/>
+            </a:ln>
+            <a:effectLst>
+              <a:outerShdw blurRad="292100" dist="139700" dir="2700000" algn="tl" rotWithShape="0">
+                <a:srgbClr val="333333">
+                  <a:alpha val="65000"/>
+                </a:srgbClr>
+              </a:outerShdw>
+            </a:effectLst>
+          </p:spPr>
+        </p:pic>
+        <p:cxnSp>
+          <p:nvCxnSpPr>
+            <p:cNvPr id="10" name="Прямая со стрелкой 9"/>
+            <p:cNvCxnSpPr/>
+            <p:nvPr/>
+          </p:nvCxnSpPr>
+          <p:spPr>
+            <a:xfrm flipV="1">
+              <a:off x="3491880" y="1988840"/>
+              <a:ext cx="1368152" cy="1656184"/>
+            </a:xfrm>
+            <a:prstGeom prst="straightConnector1">
+              <a:avLst/>
+            </a:prstGeom>
+            <a:ln w="28575">
+              <a:solidFill>
+                <a:srgbClr val="7030A0"/>
+              </a:solidFill>
+              <a:tailEnd type="arrow"/>
+            </a:ln>
+          </p:spPr>
+          <p:style>
+            <a:lnRef idx="1">
+              <a:schemeClr val="accent1"/>
+            </a:lnRef>
+            <a:fillRef idx="0">
+              <a:schemeClr val="accent1"/>
+            </a:fillRef>
+            <a:effectRef idx="0">
+              <a:schemeClr val="accent1"/>
+            </a:effectRef>
+            <a:fontRef idx="minor">
+              <a:schemeClr val="tx1"/>
+            </a:fontRef>
+          </p:style>
+        </p:cxnSp>
+        <p:cxnSp>
+          <p:nvCxnSpPr>
+            <p:cNvPr id="13" name="Прямая со стрелкой 12"/>
+            <p:cNvCxnSpPr/>
+            <p:nvPr/>
+          </p:nvCxnSpPr>
+          <p:spPr>
+            <a:xfrm>
+              <a:off x="2915816" y="4005064"/>
+              <a:ext cx="2376264" cy="504056"/>
+            </a:xfrm>
+            <a:prstGeom prst="straightConnector1">
+              <a:avLst/>
+            </a:prstGeom>
+            <a:ln w="28575">
+              <a:tailEnd type="arrow"/>
+            </a:ln>
+          </p:spPr>
+          <p:style>
+            <a:lnRef idx="1">
+              <a:schemeClr val="accent4"/>
+            </a:lnRef>
+            <a:fillRef idx="0">
+              <a:schemeClr val="accent4"/>
+            </a:fillRef>
+            <a:effectRef idx="0">
+              <a:schemeClr val="accent4"/>
+            </a:effectRef>
+            <a:fontRef idx="minor">
+              <a:schemeClr val="tx1"/>
+            </a:fontRef>
+          </p:style>
+        </p:cxnSp>
+      </p:grpSp>
     </p:spTree>
   </p:cSld>
   <p:clrMapOvr>
     <a:masterClrMapping/>
   </p:clrMapOvr>
+  <p:timing>
+    <p:tnLst>
+      <p:par>
+        <p:cTn id="1" dur="indefinite" restart="never" nodeType="tmRoot">
+          <p:childTnLst>
+            <p:seq concurrent="1" nextAc="seek">
+              <p:cTn id="2" dur="indefinite" nodeType="mainSeq">
+                <p:childTnLst>
+                  <p:par>
+                    <p:cTn id="3" fill="hold">
+                      <p:stCondLst>
+                        <p:cond delay="indefinite"/>
+                      </p:stCondLst>
+                      <p:childTnLst>
+                        <p:par>
+                          <p:cTn id="4" fill="hold">
+                            <p:stCondLst>
+                              <p:cond delay="0"/>
+                            </p:stCondLst>
+                            <p:childTnLst>
+                              <p:par>
+                                <p:cTn id="5" presetID="2" presetClass="exit" presetSubtype="4" fill="hold" nodeType="clickEffect">
+                                  <p:stCondLst>
+                                    <p:cond delay="0"/>
+                                  </p:stCondLst>
+                                  <p:childTnLst>
+                                    <p:anim calcmode="lin" valueType="num">
+                                      <p:cBhvr additive="base">
+                                        <p:cTn id="6" dur="500"/>
+                                        <p:tgtEl>
+                                          <p:spTgt spid="3074"/>
+                                        </p:tgtEl>
+                                        <p:attrNameLst>
+                                          <p:attrName>ppt_x</p:attrName>
+                                        </p:attrNameLst>
+                                      </p:cBhvr>
+                                      <p:tavLst>
+                                        <p:tav tm="0">
+                                          <p:val>
+                                            <p:strVal val="ppt_x"/>
+                                          </p:val>
+                                        </p:tav>
+                                        <p:tav tm="100000">
+                                          <p:val>
+                                            <p:strVal val="ppt_x"/>
+                                          </p:val>
+                                        </p:tav>
+                                      </p:tavLst>
+                                    </p:anim>
+                                    <p:anim calcmode="lin" valueType="num">
+                                      <p:cBhvr additive="base">
+                                        <p:cTn id="7" dur="500"/>
+                                        <p:tgtEl>
+                                          <p:spTgt spid="3074"/>
+                                        </p:tgtEl>
+                                        <p:attrNameLst>
+                                          <p:attrName>ppt_y</p:attrName>
+                                        </p:attrNameLst>
+                                      </p:cBhvr>
+                                      <p:tavLst>
+                                        <p:tav tm="0">
+                                          <p:val>
+                                            <p:strVal val="ppt_y"/>
+                                          </p:val>
+                                        </p:tav>
+                                        <p:tav tm="100000">
+                                          <p:val>
+                                            <p:strVal val="1+ppt_h/2"/>
+                                          </p:val>
+                                        </p:tav>
+                                      </p:tavLst>
+                                    </p:anim>
+                                    <p:set>
+                                      <p:cBhvr>
+                                        <p:cTn id="8" dur="1" fill="hold">
+                                          <p:stCondLst>
+                                            <p:cond delay="499"/>
+                                          </p:stCondLst>
+                                        </p:cTn>
+                                        <p:tgtEl>
+                                          <p:spTgt spid="3074"/>
+                                        </p:tgtEl>
+                                        <p:attrNameLst>
+                                          <p:attrName>style.visibility</p:attrName>
+                                        </p:attrNameLst>
+                                      </p:cBhvr>
+                                      <p:to>
+                                        <p:strVal val="hidden"/>
+                                      </p:to>
+                                    </p:set>
+                                  </p:childTnLst>
+                                </p:cTn>
+                              </p:par>
+                              <p:par>
+                                <p:cTn id="9" presetID="2" presetClass="entr" presetSubtype="4" fill="hold" nodeType="withEffect">
+                                  <p:stCondLst>
+                                    <p:cond delay="0"/>
+                                  </p:stCondLst>
+                                  <p:childTnLst>
+                                    <p:set>
+                                      <p:cBhvr>
+                                        <p:cTn id="10" dur="1" fill="hold">
+                                          <p:stCondLst>
+                                            <p:cond delay="0"/>
+                                          </p:stCondLst>
+                                        </p:cTn>
+                                        <p:tgtEl>
+                                          <p:spTgt spid="11"/>
+                                        </p:tgtEl>
+                                        <p:attrNameLst>
+                                          <p:attrName>style.visibility</p:attrName>
+                                        </p:attrNameLst>
+                                      </p:cBhvr>
+                                      <p:to>
+                                        <p:strVal val="visible"/>
+                                      </p:to>
+                                    </p:set>
+                                    <p:anim calcmode="lin" valueType="num">
+                                      <p:cBhvr additive="base">
+                                        <p:cTn id="11" dur="500" fill="hold"/>
+                                        <p:tgtEl>
+                                          <p:spTgt spid="11"/>
+                                        </p:tgtEl>
+                                        <p:attrNameLst>
+                                          <p:attrName>ppt_x</p:attrName>
+                                        </p:attrNameLst>
+                                      </p:cBhvr>
+                                      <p:tavLst>
+                                        <p:tav tm="0">
+                                          <p:val>
+                                            <p:strVal val="#ppt_x"/>
+                                          </p:val>
+                                        </p:tav>
+                                        <p:tav tm="100000">
+                                          <p:val>
+                                            <p:strVal val="#ppt_x"/>
+                                          </p:val>
+                                        </p:tav>
+                                      </p:tavLst>
+                                    </p:anim>
+                                    <p:anim calcmode="lin" valueType="num">
+                                      <p:cBhvr additive="base">
+                                        <p:cTn id="12" dur="500" fill="hold"/>
+                                        <p:tgtEl>
+                                          <p:spTgt spid="11"/>
+                                        </p:tgtEl>
+                                        <p:attrNameLst>
+                                          <p:attrName>ppt_y</p:attrName>
+                                        </p:attrNameLst>
+                                      </p:cBhvr>
+                                      <p:tavLst>
+                                        <p:tav tm="0">
+                                          <p:val>
+                                            <p:strVal val="1+#ppt_h/2"/>
+                                          </p:val>
+                                        </p:tav>
+                                        <p:tav tm="100000">
+                                          <p:val>
+                                            <p:strVal val="#ppt_y"/>
+                                          </p:val>
+                                        </p:tav>
+                                      </p:tavLst>
+                                    </p:anim>
+                                  </p:childTnLst>
+                                </p:cTn>
+                              </p:par>
+                            </p:childTnLst>
+                          </p:cTn>
+                        </p:par>
+                      </p:childTnLst>
+                    </p:cTn>
+                  </p:par>
+                </p:childTnLst>
+              </p:cTn>
+              <p:prevCondLst>
+                <p:cond evt="onPrev" delay="0">
+                  <p:tgtEl>
+                    <p:sldTgt/>
+                  </p:tgtEl>
+                </p:cond>
+              </p:prevCondLst>
+              <p:nextCondLst>
+                <p:cond evt="onNext" delay="0">
+                  <p:tgtEl>
+                    <p:sldTgt/>
+                  </p:tgtEl>
+                </p:cond>
+              </p:nextCondLst>
+            </p:seq>
+          </p:childTnLst>
+        </p:cTn>
+      </p:par>
+    </p:tnLst>
+  </p:timing>
 </p:sld>
 </file>
 
 <file path=ppt/slides/slide11.xml><?xml version="1.0" encoding="utf-8"?>
-<p:sld xmlns:a="http://schemas.openxmlformats.org/drawingml/2006/main" xmlns:r="http://schemas.openxmlformats.org/officeDocument/2006/relationships" xmlns:p="http://schemas.openxmlformats.org/presentationml/2006/main">
-  <p:cSld>
-    <p:spTree>
-      <p:nvGrpSpPr>
-        <p:cNvPr id="1" name=""/>
-        <p:cNvGrpSpPr/>
-        <p:nvPr/>
-      </p:nvGrpSpPr>
-      <p:grpSpPr>
-        <a:xfrm>
-          <a:off x="0" y="0"/>
-          <a:ext cx="0" cy="0"/>
-          <a:chOff x="0" y="0"/>
-          <a:chExt cx="0" cy="0"/>
-        </a:xfrm>
-      </p:grpSpPr>
-      <p:sp>
-        <p:nvSpPr>
-          <p:cNvPr id="2" name="Заголовок 1"/>
-          <p:cNvSpPr>
-            <a:spLocks noGrp="1"/>
-          </p:cNvSpPr>
-          <p:nvPr>
-            <p:ph type="title"/>
-          </p:nvPr>
-        </p:nvSpPr>
-        <p:spPr/>
-        <p:txBody>
-          <a:bodyPr/>
-          <a:lstStyle/>
-          <a:p>
-            <a:r>
-              <a:rPr lang="ru-RU" dirty="0" smtClean="0"/>
-              <a:t>Дополнительно – обертка </a:t>
-            </a:r>
-            <a:r>
-              <a:rPr lang="en-US" dirty="0" err="1" smtClean="0"/>
-              <a:t>TrieConsoleAPI</a:t>
-            </a:r>
-            <a:endParaRPr lang="ru-RU" dirty="0"/>
-          </a:p>
-        </p:txBody>
-      </p:sp>
-      <p:sp>
-        <p:nvSpPr>
-          <p:cNvPr id="3" name="Содержимое 2"/>
-          <p:cNvSpPr>
-            <a:spLocks noGrp="1"/>
-          </p:cNvSpPr>
-          <p:nvPr>
-            <p:ph idx="1"/>
-          </p:nvPr>
-        </p:nvSpPr>
-        <p:spPr>
-          <a:xfrm>
-            <a:off x="457200" y="1882808"/>
-            <a:ext cx="7571184" cy="2842336"/>
-          </a:xfrm>
-        </p:spPr>
-        <p:txBody>
-          <a:bodyPr>
-            <a:normAutofit fontScale="70000" lnSpcReduction="20000"/>
-          </a:bodyPr>
-          <a:lstStyle/>
-          <a:p>
-            <a:pPr lvl="1"/>
-            <a:r>
-              <a:rPr lang="ru-RU" b="1" dirty="0" smtClean="0"/>
-              <a:t>Визуализация:</a:t>
-            </a:r>
-          </a:p>
-          <a:p>
-            <a:pPr marL="1051560" lvl="1" indent="-514350">
-              <a:buFont typeface="+mj-lt"/>
-              <a:buAutoNum type="arabicPeriod"/>
-            </a:pPr>
-            <a:r>
-              <a:rPr lang="en-US" dirty="0" smtClean="0"/>
-              <a:t>Add</a:t>
-            </a:r>
-          </a:p>
-          <a:p>
-            <a:pPr marL="1051560" lvl="1" indent="-514350">
-              <a:buFont typeface="+mj-lt"/>
-              <a:buAutoNum type="arabicPeriod"/>
-            </a:pPr>
-            <a:r>
-              <a:rPr lang="en-US" dirty="0" smtClean="0"/>
-              <a:t>Remove</a:t>
-            </a:r>
-            <a:endParaRPr lang="ru-RU" dirty="0" smtClean="0"/>
-          </a:p>
-          <a:p>
-            <a:pPr marL="1051560" lvl="1" indent="-514350">
-              <a:buFont typeface="+mj-lt"/>
-              <a:buAutoNum type="arabicPeriod"/>
-            </a:pPr>
-            <a:r>
-              <a:rPr lang="en-US" dirty="0" err="1" smtClean="0"/>
-              <a:t>GetWordByKey</a:t>
-            </a:r>
-            <a:endParaRPr lang="ru-RU" dirty="0" smtClean="0"/>
-          </a:p>
-          <a:p>
-            <a:pPr marL="1051560" lvl="1" indent="-514350">
-              <a:buFont typeface="+mj-lt"/>
-              <a:buAutoNum type="arabicPeriod"/>
-            </a:pPr>
-            <a:r>
-              <a:rPr lang="en-US" dirty="0" err="1" smtClean="0"/>
-              <a:t>GetWordsByPrefix</a:t>
-            </a:r>
-            <a:endParaRPr lang="en-US" dirty="0" smtClean="0"/>
-          </a:p>
-          <a:p>
-            <a:pPr marL="1051560" lvl="1" indent="-514350"/>
-            <a:r>
-              <a:rPr lang="ru-RU" b="1" dirty="0" smtClean="0"/>
-              <a:t>Дополнения:</a:t>
-            </a:r>
-          </a:p>
-          <a:p>
-            <a:pPr marL="1051560" lvl="1" indent="-514350">
-              <a:buFont typeface="+mj-lt"/>
-              <a:buAutoNum type="arabicPeriod"/>
-            </a:pPr>
-            <a:r>
-              <a:rPr lang="en-US" dirty="0" smtClean="0"/>
-              <a:t>Add (</a:t>
-            </a:r>
-            <a:r>
-              <a:rPr lang="en-US" dirty="0" err="1" smtClean="0"/>
-              <a:t>HashMap</a:t>
-            </a:r>
-            <a:r>
-              <a:rPr lang="en-US" dirty="0" smtClean="0"/>
-              <a:t>): </a:t>
-            </a:r>
-            <a:r>
-              <a:rPr lang="ru-RU" dirty="0" smtClean="0"/>
-              <a:t>переводим словарь в префиксное дерево</a:t>
-            </a:r>
-          </a:p>
-          <a:p>
-            <a:pPr marL="1051560" lvl="1" indent="-514350">
-              <a:buFont typeface="+mj-lt"/>
-              <a:buAutoNum type="arabicPeriod"/>
-            </a:pPr>
-            <a:r>
-              <a:rPr lang="en-US" dirty="0" smtClean="0"/>
-              <a:t>Contains: </a:t>
-            </a:r>
-            <a:r>
-              <a:rPr lang="ru-RU" dirty="0" smtClean="0"/>
-              <a:t>проверка наличия </a:t>
-            </a:r>
-            <a:r>
-              <a:rPr lang="ru-RU" dirty="0" smtClean="0"/>
-              <a:t>слова</a:t>
-            </a:r>
-          </a:p>
-          <a:p>
-            <a:pPr marL="1051560" lvl="1" indent="-514350">
-              <a:buFont typeface="+mj-lt"/>
-              <a:buAutoNum type="arabicPeriod"/>
-            </a:pPr>
-            <a:r>
-              <a:rPr lang="en-US" dirty="0" smtClean="0"/>
-              <a:t>Clear: </a:t>
-            </a:r>
-            <a:r>
-              <a:rPr lang="ru-RU" dirty="0" err="1" smtClean="0"/>
-              <a:t>очитска</a:t>
-            </a:r>
-            <a:endParaRPr lang="en-US" dirty="0" smtClean="0"/>
-          </a:p>
-          <a:p>
-            <a:pPr marL="1051560" lvl="1" indent="-514350">
-              <a:buFont typeface="+mj-lt"/>
-              <a:buAutoNum type="arabicPeriod"/>
-            </a:pPr>
-            <a:endParaRPr lang="ru-RU" dirty="0"/>
-          </a:p>
-        </p:txBody>
-      </p:sp>
-      <p:pic>
-        <p:nvPicPr>
-          <p:cNvPr id="3075" name="Picture 3"/>
-          <p:cNvPicPr>
-            <a:picLocks noChangeAspect="1" noChangeArrowheads="1"/>
-          </p:cNvPicPr>
-          <p:nvPr/>
-        </p:nvPicPr>
-        <p:blipFill>
-          <a:blip r:embed="rId2" cstate="print"/>
-          <a:srcRect/>
-          <a:stretch>
-            <a:fillRect/>
-          </a:stretch>
-        </p:blipFill>
-        <p:spPr bwMode="auto">
-          <a:xfrm>
-            <a:off x="1979712" y="4797152"/>
-            <a:ext cx="5435600" cy="1485900"/>
-          </a:xfrm>
-          <a:prstGeom prst="rect">
-            <a:avLst/>
-          </a:prstGeom>
-          <a:ln>
-            <a:noFill/>
-          </a:ln>
-          <a:effectLst>
-            <a:outerShdw blurRad="292100" dist="139700" dir="2700000" algn="tl" rotWithShape="0">
-              <a:srgbClr val="333333">
-                <a:alpha val="65000"/>
-              </a:srgbClr>
-            </a:outerShdw>
-          </a:effectLst>
-        </p:spPr>
-      </p:pic>
-    </p:spTree>
-  </p:cSld>
-  <p:clrMapOvr>
-    <a:masterClrMapping/>
-  </p:clrMapOvr>
-</p:sld>
-</file>
-
-<file path=ppt/slides/slide12.xml><?xml version="1.0" encoding="utf-8"?>
 <p:sld xmlns:a="http://schemas.openxmlformats.org/drawingml/2006/main" xmlns:r="http://schemas.openxmlformats.org/officeDocument/2006/relationships" xmlns:p="http://schemas.openxmlformats.org/presentationml/2006/main">
   <p:cSld>
     <p:spTree>
@@ -4718,10 +4714,17 @@
   <p:clrMapOvr>
     <a:masterClrMapping/>
   </p:clrMapOvr>
+  <p:timing>
+    <p:tnLst>
+      <p:par>
+        <p:cTn id="1" dur="indefinite" restart="never" nodeType="tmRoot"/>
+      </p:par>
+    </p:tnLst>
+  </p:timing>
 </p:sld>
 </file>
 
-<file path=ppt/slides/slide13.xml><?xml version="1.0" encoding="utf-8"?>
+<file path=ppt/slides/slide12.xml><?xml version="1.0" encoding="utf-8"?>
 <p:sld xmlns:a="http://schemas.openxmlformats.org/drawingml/2006/main" xmlns:r="http://schemas.openxmlformats.org/officeDocument/2006/relationships" xmlns:p="http://schemas.openxmlformats.org/presentationml/2006/main">
   <p:cSld>
     <p:spTree>
@@ -4778,7 +4781,7 @@
         </p:blipFill>
         <p:spPr bwMode="auto">
           <a:xfrm>
-            <a:off x="1043608" y="1700808"/>
+            <a:off x="971600" y="1700808"/>
             <a:ext cx="7077075" cy="581025"/>
           </a:xfrm>
           <a:prstGeom prst="rect">
@@ -4832,13 +4835,15 @@
       <p:cxnSp>
         <p:nvCxnSpPr>
           <p:cNvPr id="7" name="Прямая со стрелкой 6"/>
-          <p:cNvCxnSpPr/>
+          <p:cNvCxnSpPr>
+            <a:stCxn id="4098" idx="2"/>
+          </p:cNvCxnSpPr>
           <p:nvPr/>
         </p:nvCxnSpPr>
         <p:spPr>
-          <a:xfrm>
-            <a:off x="4499992" y="2276872"/>
-            <a:ext cx="0" cy="504056"/>
+          <a:xfrm flipH="1">
+            <a:off x="4499992" y="2281833"/>
+            <a:ext cx="10146" cy="499095"/>
           </a:xfrm>
           <a:prstGeom prst="straightConnector1">
             <a:avLst/>
@@ -4934,6 +4939,245 @@
   <p:clrMapOvr>
     <a:masterClrMapping/>
   </p:clrMapOvr>
+  <p:timing>
+    <p:tnLst>
+      <p:par>
+        <p:cTn id="1" dur="indefinite" restart="never" nodeType="tmRoot"/>
+      </p:par>
+    </p:tnLst>
+  </p:timing>
+</p:sld>
+</file>
+
+<file path=ppt/slides/slide13.xml><?xml version="1.0" encoding="utf-8"?>
+<p:sld xmlns:a="http://schemas.openxmlformats.org/drawingml/2006/main" xmlns:r="http://schemas.openxmlformats.org/officeDocument/2006/relationships" xmlns:p="http://schemas.openxmlformats.org/presentationml/2006/main">
+  <p:cSld>
+    <p:spTree>
+      <p:nvGrpSpPr>
+        <p:cNvPr id="1" name=""/>
+        <p:cNvGrpSpPr/>
+        <p:nvPr/>
+      </p:nvGrpSpPr>
+      <p:grpSpPr>
+        <a:xfrm>
+          <a:off x="0" y="0"/>
+          <a:ext cx="0" cy="0"/>
+          <a:chOff x="0" y="0"/>
+          <a:chExt cx="0" cy="0"/>
+        </a:xfrm>
+      </p:grpSpPr>
+      <p:sp>
+        <p:nvSpPr>
+          <p:cNvPr id="2" name="Заголовок 1"/>
+          <p:cNvSpPr>
+            <a:spLocks noGrp="1"/>
+          </p:cNvSpPr>
+          <p:nvPr>
+            <p:ph type="title"/>
+          </p:nvPr>
+        </p:nvSpPr>
+        <p:spPr/>
+        <p:txBody>
+          <a:bodyPr/>
+          <a:lstStyle/>
+          <a:p>
+            <a:r>
+              <a:rPr lang="ru-RU" dirty="0" smtClean="0"/>
+              <a:t>Дополнительно – обертка </a:t>
+            </a:r>
+            <a:r>
+              <a:rPr lang="en-US" dirty="0" err="1" smtClean="0"/>
+              <a:t>TrieConsoleAPI</a:t>
+            </a:r>
+            <a:endParaRPr lang="ru-RU" dirty="0"/>
+          </a:p>
+        </p:txBody>
+      </p:sp>
+      <p:sp>
+        <p:nvSpPr>
+          <p:cNvPr id="3" name="Содержимое 2"/>
+          <p:cNvSpPr>
+            <a:spLocks noGrp="1"/>
+          </p:cNvSpPr>
+          <p:nvPr>
+            <p:ph idx="1"/>
+          </p:nvPr>
+        </p:nvSpPr>
+        <p:spPr>
+          <a:xfrm>
+            <a:off x="457200" y="1882808"/>
+            <a:ext cx="7571184" cy="2842336"/>
+          </a:xfrm>
+        </p:spPr>
+        <p:txBody>
+          <a:bodyPr>
+            <a:normAutofit fontScale="70000" lnSpcReduction="20000"/>
+          </a:bodyPr>
+          <a:lstStyle/>
+          <a:p>
+            <a:pPr lvl="1"/>
+            <a:r>
+              <a:rPr lang="ru-RU" b="1" dirty="0" smtClean="0"/>
+              <a:t>Визуализация:</a:t>
+            </a:r>
+          </a:p>
+          <a:p>
+            <a:pPr marL="1051560" lvl="1" indent="-514350">
+              <a:buFont typeface="+mj-lt"/>
+              <a:buAutoNum type="arabicPeriod"/>
+            </a:pPr>
+            <a:r>
+              <a:rPr lang="en-US" dirty="0" smtClean="0"/>
+              <a:t>Add</a:t>
+            </a:r>
+          </a:p>
+          <a:p>
+            <a:pPr marL="1051560" lvl="1" indent="-514350">
+              <a:buFont typeface="+mj-lt"/>
+              <a:buAutoNum type="arabicPeriod"/>
+            </a:pPr>
+            <a:r>
+              <a:rPr lang="en-US" dirty="0" smtClean="0"/>
+              <a:t>Remove</a:t>
+            </a:r>
+            <a:endParaRPr lang="ru-RU" dirty="0" smtClean="0"/>
+          </a:p>
+          <a:p>
+            <a:pPr marL="1051560" lvl="1" indent="-514350">
+              <a:buFont typeface="+mj-lt"/>
+              <a:buAutoNum type="arabicPeriod"/>
+            </a:pPr>
+            <a:r>
+              <a:rPr lang="en-US" dirty="0" err="1" smtClean="0"/>
+              <a:t>GetWordByKey</a:t>
+            </a:r>
+            <a:endParaRPr lang="ru-RU" dirty="0" smtClean="0"/>
+          </a:p>
+          <a:p>
+            <a:pPr marL="1051560" lvl="1" indent="-514350">
+              <a:buFont typeface="+mj-lt"/>
+              <a:buAutoNum type="arabicPeriod"/>
+            </a:pPr>
+            <a:r>
+              <a:rPr lang="en-US" dirty="0" err="1" smtClean="0"/>
+              <a:t>GetWordsByPrefix</a:t>
+            </a:r>
+            <a:endParaRPr lang="en-US" dirty="0" smtClean="0"/>
+          </a:p>
+          <a:p>
+            <a:pPr marL="1051560" lvl="1" indent="-514350"/>
+            <a:r>
+              <a:rPr lang="ru-RU" b="1" dirty="0" smtClean="0"/>
+              <a:t>Дополнения:</a:t>
+            </a:r>
+          </a:p>
+          <a:p>
+            <a:pPr marL="1051560" lvl="1" indent="-514350">
+              <a:buFont typeface="+mj-lt"/>
+              <a:buAutoNum type="arabicPeriod"/>
+            </a:pPr>
+            <a:r>
+              <a:rPr lang="en-US" dirty="0" smtClean="0"/>
+              <a:t>Add (</a:t>
+            </a:r>
+            <a:r>
+              <a:rPr lang="en-US" dirty="0" err="1" smtClean="0"/>
+              <a:t>HashMap</a:t>
+            </a:r>
+            <a:r>
+              <a:rPr lang="en-US" dirty="0" smtClean="0"/>
+              <a:t>): </a:t>
+            </a:r>
+            <a:r>
+              <a:rPr lang="ru-RU" dirty="0" smtClean="0"/>
+              <a:t>переводим словарь в префиксное дерево</a:t>
+            </a:r>
+          </a:p>
+          <a:p>
+            <a:pPr marL="1051560" lvl="1" indent="-514350">
+              <a:buFont typeface="+mj-lt"/>
+              <a:buAutoNum type="arabicPeriod"/>
+            </a:pPr>
+            <a:r>
+              <a:rPr lang="en-US" dirty="0" smtClean="0"/>
+              <a:t>Contains: </a:t>
+            </a:r>
+            <a:r>
+              <a:rPr lang="ru-RU" dirty="0" smtClean="0"/>
+              <a:t>проверка наличия слова</a:t>
+            </a:r>
+          </a:p>
+          <a:p>
+            <a:pPr marL="1051560" lvl="1" indent="-514350">
+              <a:buFont typeface="+mj-lt"/>
+              <a:buAutoNum type="arabicPeriod"/>
+            </a:pPr>
+            <a:r>
+              <a:rPr lang="en-US" dirty="0" smtClean="0"/>
+              <a:t>Clear: </a:t>
+            </a:r>
+            <a:r>
+              <a:rPr lang="ru-RU" dirty="0" err="1" smtClean="0"/>
+              <a:t>очитска</a:t>
+            </a:r>
+            <a:endParaRPr lang="en-US" dirty="0" smtClean="0"/>
+          </a:p>
+          <a:p>
+            <a:pPr marL="1051560" lvl="1" indent="-514350">
+              <a:buFont typeface="+mj-lt"/>
+              <a:buAutoNum type="arabicPeriod"/>
+            </a:pPr>
+            <a:endParaRPr lang="ru-RU" dirty="0"/>
+          </a:p>
+        </p:txBody>
+      </p:sp>
+      <p:pic>
+        <p:nvPicPr>
+          <p:cNvPr id="3075" name="Picture 3"/>
+          <p:cNvPicPr>
+            <a:picLocks noChangeAspect="1" noChangeArrowheads="1"/>
+          </p:cNvPicPr>
+          <p:nvPr/>
+        </p:nvPicPr>
+        <p:blipFill>
+          <a:blip r:embed="rId2" cstate="print"/>
+          <a:srcRect/>
+          <a:stretch>
+            <a:fillRect/>
+          </a:stretch>
+        </p:blipFill>
+        <p:spPr bwMode="auto">
+          <a:xfrm>
+            <a:off x="1979712" y="4797152"/>
+            <a:ext cx="5435600" cy="1485900"/>
+          </a:xfrm>
+          <a:prstGeom prst="rect">
+            <a:avLst/>
+          </a:prstGeom>
+          <a:ln>
+            <a:noFill/>
+          </a:ln>
+          <a:effectLst>
+            <a:outerShdw blurRad="292100" dist="139700" dir="2700000" algn="tl" rotWithShape="0">
+              <a:srgbClr val="333333">
+                <a:alpha val="65000"/>
+              </a:srgbClr>
+            </a:outerShdw>
+          </a:effectLst>
+        </p:spPr>
+      </p:pic>
+    </p:spTree>
+  </p:cSld>
+  <p:clrMapOvr>
+    <a:masterClrMapping/>
+  </p:clrMapOvr>
+  <p:timing>
+    <p:tnLst>
+      <p:par>
+        <p:cTn id="1" dur="indefinite" restart="never" nodeType="tmRoot"/>
+      </p:par>
+    </p:tnLst>
+  </p:timing>
 </p:sld>
 </file>
 
@@ -4995,7 +5239,7 @@
         </p:spPr>
         <p:txBody>
           <a:bodyPr>
-            <a:normAutofit fontScale="85000" lnSpcReduction="20000"/>
+            <a:normAutofit fontScale="92500" lnSpcReduction="10000"/>
           </a:bodyPr>
           <a:lstStyle/>
           <a:p>
@@ -5007,29 +5251,7 @@
           <a:p>
             <a:r>
               <a:rPr lang="ru-RU" dirty="0" smtClean="0"/>
-              <a:t>Сортируется линейно </a:t>
-            </a:r>
-            <a:r>
-              <a:rPr lang="en-US" dirty="0" smtClean="0"/>
-              <a:t>[</a:t>
-            </a:r>
-            <a:r>
-              <a:rPr lang="ru-RU" dirty="0" smtClean="0"/>
-              <a:t>О(</a:t>
-            </a:r>
-            <a:r>
-              <a:rPr lang="en-US" dirty="0" smtClean="0"/>
-              <a:t>n + k)]</a:t>
-            </a:r>
-            <a:r>
-              <a:rPr lang="ru-RU" dirty="0" smtClean="0"/>
-              <a:t> сортировкой подсчетом</a:t>
-            </a:r>
-          </a:p>
-          <a:p>
-            <a:r>
-              <a:rPr lang="ru-RU" dirty="0" smtClean="0"/>
-              <a:t>Сортировка по количеству вхождений для иерархически построенных структур</a:t>
+              <a:t>Подсчет количества вхождений для иерархически построенных структур</a:t>
             </a:r>
           </a:p>
           <a:p>
@@ -5072,6 +5294,13 @@
   <p:clrMapOvr>
     <a:masterClrMapping/>
   </p:clrMapOvr>
+  <p:timing>
+    <p:tnLst>
+      <p:par>
+        <p:cTn id="1" dur="indefinite" restart="never" nodeType="tmRoot"/>
+      </p:par>
+    </p:tnLst>
+  </p:timing>
 </p:sld>
 </file>
 
@@ -5151,6 +5380,13 @@
   <p:clrMapOvr>
     <a:masterClrMapping/>
   </p:clrMapOvr>
+  <p:timing>
+    <p:tnLst>
+      <p:par>
+        <p:cTn id="1" dur="indefinite" restart="never" nodeType="tmRoot"/>
+      </p:par>
+    </p:tnLst>
+  </p:timing>
 </p:sld>
 </file>
 
@@ -5270,6 +5506,13 @@
   <p:clrMapOvr>
     <a:masterClrMapping/>
   </p:clrMapOvr>
+  <p:timing>
+    <p:tnLst>
+      <p:par>
+        <p:cTn id="1" dur="indefinite" restart="never" nodeType="tmRoot"/>
+      </p:par>
+    </p:tnLst>
+  </p:timing>
 </p:sld>
 </file>
 
@@ -5354,6 +5597,13 @@
   <p:clrMapOvr>
     <a:masterClrMapping/>
   </p:clrMapOvr>
+  <p:timing>
+    <p:tnLst>
+      <p:par>
+        <p:cTn id="1" dur="indefinite" restart="never" nodeType="tmRoot"/>
+      </p:par>
+    </p:tnLst>
+  </p:timing>
 </p:sld>
 </file>
 
@@ -5889,6 +6139,13 @@
   <p:clrMapOvr>
     <a:masterClrMapping/>
   </p:clrMapOvr>
+  <p:timing>
+    <p:tnLst>
+      <p:par>
+        <p:cTn id="1" dur="indefinite" restart="never" nodeType="tmRoot"/>
+      </p:par>
+    </p:tnLst>
+  </p:timing>
 </p:sld>
 </file>
 
@@ -7170,6 +7427,13 @@
   <p:clrMapOvr>
     <a:masterClrMapping/>
   </p:clrMapOvr>
+  <p:timing>
+    <p:tnLst>
+      <p:par>
+        <p:cTn id="1" dur="indefinite" restart="never" nodeType="tmRoot"/>
+      </p:par>
+    </p:tnLst>
+  </p:timing>
 </p:sld>
 </file>
 
@@ -7190,6 +7454,41 @@
           <a:chExt cx="0" cy="0"/>
         </a:xfrm>
       </p:grpSpPr>
+      <p:pic>
+        <p:nvPicPr>
+          <p:cNvPr id="1026" name="Picture 2"/>
+          <p:cNvPicPr>
+            <a:picLocks noChangeAspect="1" noChangeArrowheads="1"/>
+          </p:cNvPicPr>
+          <p:nvPr/>
+        </p:nvPicPr>
+        <p:blipFill>
+          <a:blip r:embed="rId2" cstate="print"/>
+          <a:srcRect/>
+          <a:stretch>
+            <a:fillRect/>
+          </a:stretch>
+        </p:blipFill>
+        <p:spPr bwMode="auto">
+          <a:xfrm>
+            <a:off x="5508104" y="3140968"/>
+            <a:ext cx="3001613" cy="2448272"/>
+          </a:xfrm>
+          <a:prstGeom prst="rect">
+            <a:avLst/>
+          </a:prstGeom>
+          <a:ln>
+            <a:noFill/>
+          </a:ln>
+          <a:effectLst>
+            <a:outerShdw blurRad="292100" dist="139700" dir="2700000" algn="tl" rotWithShape="0">
+              <a:srgbClr val="333333">
+                <a:alpha val="65000"/>
+              </a:srgbClr>
+            </a:outerShdw>
+          </a:effectLst>
+        </p:spPr>
+      </p:pic>
       <p:sp>
         <p:nvSpPr>
           <p:cNvPr id="2" name="Заголовок 1"/>
@@ -7307,7 +7606,7 @@
           <p:nvPr/>
         </p:nvPicPr>
         <p:blipFill>
-          <a:blip r:embed="rId2" cstate="print"/>
+          <a:blip r:embed="rId3" cstate="print"/>
           <a:srcRect/>
           <a:stretch>
             <a:fillRect/>
@@ -7317,41 +7616,6 @@
           <a:xfrm>
             <a:off x="395536" y="1916832"/>
             <a:ext cx="3923194" cy="4320480"/>
-          </a:xfrm>
-          <a:prstGeom prst="rect">
-            <a:avLst/>
-          </a:prstGeom>
-          <a:ln>
-            <a:noFill/>
-          </a:ln>
-          <a:effectLst>
-            <a:outerShdw blurRad="292100" dist="139700" dir="2700000" algn="tl" rotWithShape="0">
-              <a:srgbClr val="333333">
-                <a:alpha val="65000"/>
-              </a:srgbClr>
-            </a:outerShdw>
-          </a:effectLst>
-        </p:spPr>
-      </p:pic>
-      <p:pic>
-        <p:nvPicPr>
-          <p:cNvPr id="3075" name="Picture 3"/>
-          <p:cNvPicPr>
-            <a:picLocks noChangeAspect="1" noChangeArrowheads="1"/>
-          </p:cNvPicPr>
-          <p:nvPr/>
-        </p:nvPicPr>
-        <p:blipFill>
-          <a:blip r:embed="rId3" cstate="print"/>
-          <a:srcRect/>
-          <a:stretch>
-            <a:fillRect/>
-          </a:stretch>
-        </p:blipFill>
-        <p:spPr bwMode="auto">
-          <a:xfrm>
-            <a:off x="4932040" y="2492896"/>
-            <a:ext cx="3590925" cy="3438525"/>
           </a:xfrm>
           <a:prstGeom prst="rect">
             <a:avLst/>
@@ -7399,11 +7663,308 @@
           </a:p>
         </p:txBody>
       </p:sp>
+      <p:grpSp>
+        <p:nvGrpSpPr>
+          <p:cNvPr id="12" name="Группа 11"/>
+          <p:cNvGrpSpPr/>
+          <p:nvPr/>
+        </p:nvGrpSpPr>
+        <p:grpSpPr>
+          <a:xfrm>
+            <a:off x="5076056" y="2564904"/>
+            <a:ext cx="3816424" cy="3438525"/>
+            <a:chOff x="4932040" y="2492896"/>
+            <a:chExt cx="3816424" cy="3438525"/>
+          </a:xfrm>
+        </p:grpSpPr>
+        <p:pic>
+          <p:nvPicPr>
+            <p:cNvPr id="3075" name="Picture 3"/>
+            <p:cNvPicPr>
+              <a:picLocks noChangeAspect="1" noChangeArrowheads="1"/>
+            </p:cNvPicPr>
+            <p:nvPr/>
+          </p:nvPicPr>
+          <p:blipFill>
+            <a:blip r:embed="rId4" cstate="print"/>
+            <a:srcRect/>
+            <a:stretch>
+              <a:fillRect/>
+            </a:stretch>
+          </p:blipFill>
+          <p:spPr bwMode="auto">
+            <a:xfrm>
+              <a:off x="4932040" y="2492896"/>
+              <a:ext cx="3590925" cy="3438525"/>
+            </a:xfrm>
+            <a:prstGeom prst="rect">
+              <a:avLst/>
+            </a:prstGeom>
+            <a:ln>
+              <a:noFill/>
+            </a:ln>
+            <a:effectLst>
+              <a:outerShdw blurRad="292100" dist="139700" dir="2700000" algn="tl" rotWithShape="0">
+                <a:srgbClr val="333333">
+                  <a:alpha val="65000"/>
+                </a:srgbClr>
+              </a:outerShdw>
+            </a:effectLst>
+          </p:spPr>
+        </p:pic>
+        <p:grpSp>
+          <p:nvGrpSpPr>
+            <p:cNvPr id="23" name="Группа 22"/>
+            <p:cNvGrpSpPr/>
+            <p:nvPr/>
+          </p:nvGrpSpPr>
+          <p:grpSpPr>
+            <a:xfrm>
+              <a:off x="8316416" y="3717032"/>
+              <a:ext cx="432048" cy="1512168"/>
+              <a:chOff x="8316416" y="3717032"/>
+              <a:chExt cx="432048" cy="1512168"/>
+            </a:xfrm>
+          </p:grpSpPr>
+          <p:grpSp>
+            <p:nvGrpSpPr>
+              <p:cNvPr id="22" name="Группа 21"/>
+              <p:cNvGrpSpPr/>
+              <p:nvPr/>
+            </p:nvGrpSpPr>
+            <p:grpSpPr>
+              <a:xfrm>
+                <a:off x="8460432" y="3717032"/>
+                <a:ext cx="288032" cy="1512168"/>
+                <a:chOff x="8460432" y="3717032"/>
+                <a:chExt cx="288032" cy="1512168"/>
+              </a:xfrm>
+            </p:grpSpPr>
+            <p:cxnSp>
+              <p:nvCxnSpPr>
+                <p:cNvPr id="15" name="Прямая соединительная линия 14"/>
+                <p:cNvCxnSpPr/>
+                <p:nvPr/>
+              </p:nvCxnSpPr>
+              <p:spPr>
+                <a:xfrm>
+                  <a:off x="8460432" y="5229200"/>
+                  <a:ext cx="288032" cy="0"/>
+                </a:xfrm>
+                <a:prstGeom prst="line">
+                  <a:avLst/>
+                </a:prstGeom>
+              </p:spPr>
+              <p:style>
+                <a:lnRef idx="1">
+                  <a:schemeClr val="accent1"/>
+                </a:lnRef>
+                <a:fillRef idx="0">
+                  <a:schemeClr val="accent1"/>
+                </a:fillRef>
+                <a:effectRef idx="0">
+                  <a:schemeClr val="accent1"/>
+                </a:effectRef>
+                <a:fontRef idx="minor">
+                  <a:schemeClr val="tx1"/>
+                </a:fontRef>
+              </p:style>
+            </p:cxnSp>
+            <p:cxnSp>
+              <p:nvCxnSpPr>
+                <p:cNvPr id="17" name="Прямая соединительная линия 16"/>
+                <p:cNvCxnSpPr/>
+                <p:nvPr/>
+              </p:nvCxnSpPr>
+              <p:spPr>
+                <a:xfrm flipV="1">
+                  <a:off x="8748464" y="3717032"/>
+                  <a:ext cx="0" cy="1512168"/>
+                </a:xfrm>
+                <a:prstGeom prst="line">
+                  <a:avLst/>
+                </a:prstGeom>
+              </p:spPr>
+              <p:style>
+                <a:lnRef idx="1">
+                  <a:schemeClr val="accent1"/>
+                </a:lnRef>
+                <a:fillRef idx="0">
+                  <a:schemeClr val="accent1"/>
+                </a:fillRef>
+                <a:effectRef idx="0">
+                  <a:schemeClr val="accent1"/>
+                </a:effectRef>
+                <a:fontRef idx="minor">
+                  <a:schemeClr val="tx1"/>
+                </a:fontRef>
+              </p:style>
+            </p:cxnSp>
+          </p:grpSp>
+          <p:cxnSp>
+            <p:nvCxnSpPr>
+              <p:cNvPr id="20" name="Прямая со стрелкой 19"/>
+              <p:cNvCxnSpPr/>
+              <p:nvPr/>
+            </p:nvCxnSpPr>
+            <p:spPr>
+              <a:xfrm flipH="1">
+                <a:off x="8316416" y="3717032"/>
+                <a:ext cx="432048" cy="0"/>
+              </a:xfrm>
+              <a:prstGeom prst="straightConnector1">
+                <a:avLst/>
+              </a:prstGeom>
+              <a:ln>
+                <a:tailEnd type="arrow"/>
+              </a:ln>
+            </p:spPr>
+            <p:style>
+              <a:lnRef idx="1">
+                <a:schemeClr val="accent1"/>
+              </a:lnRef>
+              <a:fillRef idx="0">
+                <a:schemeClr val="accent1"/>
+              </a:fillRef>
+              <a:effectRef idx="0">
+                <a:schemeClr val="accent1"/>
+              </a:effectRef>
+              <a:fontRef idx="minor">
+                <a:schemeClr val="tx1"/>
+              </a:fontRef>
+            </p:style>
+          </p:cxnSp>
+        </p:grpSp>
+      </p:grpSp>
     </p:spTree>
   </p:cSld>
   <p:clrMapOvr>
     <a:masterClrMapping/>
   </p:clrMapOvr>
+  <p:transition>
+    <p:pull/>
+  </p:transition>
+  <p:timing>
+    <p:tnLst>
+      <p:par>
+        <p:cTn id="1" dur="indefinite" restart="never" nodeType="tmRoot">
+          <p:childTnLst>
+            <p:seq concurrent="1" nextAc="seek">
+              <p:cTn id="2" dur="indefinite" nodeType="mainSeq">
+                <p:childTnLst>
+                  <p:par>
+                    <p:cTn id="3" fill="hold">
+                      <p:stCondLst>
+                        <p:cond delay="indefinite"/>
+                      </p:stCondLst>
+                      <p:childTnLst>
+                        <p:par>
+                          <p:cTn id="4" fill="hold">
+                            <p:stCondLst>
+                              <p:cond delay="0"/>
+                            </p:stCondLst>
+                            <p:childTnLst>
+                              <p:par>
+                                <p:cTn id="5" presetID="2" presetClass="entr" presetSubtype="2" fill="hold" nodeType="clickEffect">
+                                  <p:stCondLst>
+                                    <p:cond delay="0"/>
+                                  </p:stCondLst>
+                                  <p:childTnLst>
+                                    <p:set>
+                                      <p:cBhvr>
+                                        <p:cTn id="6" dur="1" fill="hold">
+                                          <p:stCondLst>
+                                            <p:cond delay="0"/>
+                                          </p:stCondLst>
+                                        </p:cTn>
+                                        <p:tgtEl>
+                                          <p:spTgt spid="12"/>
+                                        </p:tgtEl>
+                                        <p:attrNameLst>
+                                          <p:attrName>style.visibility</p:attrName>
+                                        </p:attrNameLst>
+                                      </p:cBhvr>
+                                      <p:to>
+                                        <p:strVal val="visible"/>
+                                      </p:to>
+                                    </p:set>
+                                    <p:anim calcmode="lin" valueType="num">
+                                      <p:cBhvr additive="base">
+                                        <p:cTn id="7" dur="500" fill="hold"/>
+                                        <p:tgtEl>
+                                          <p:spTgt spid="12"/>
+                                        </p:tgtEl>
+                                        <p:attrNameLst>
+                                          <p:attrName>ppt_x</p:attrName>
+                                        </p:attrNameLst>
+                                      </p:cBhvr>
+                                      <p:tavLst>
+                                        <p:tav tm="0">
+                                          <p:val>
+                                            <p:strVal val="1+#ppt_w/2"/>
+                                          </p:val>
+                                        </p:tav>
+                                        <p:tav tm="100000">
+                                          <p:val>
+                                            <p:strVal val="#ppt_x"/>
+                                          </p:val>
+                                        </p:tav>
+                                      </p:tavLst>
+                                    </p:anim>
+                                    <p:anim calcmode="lin" valueType="num">
+                                      <p:cBhvr additive="base">
+                                        <p:cTn id="8" dur="500" fill="hold"/>
+                                        <p:tgtEl>
+                                          <p:spTgt spid="12"/>
+                                        </p:tgtEl>
+                                        <p:attrNameLst>
+                                          <p:attrName>ppt_y</p:attrName>
+                                        </p:attrNameLst>
+                                      </p:cBhvr>
+                                      <p:tavLst>
+                                        <p:tav tm="0">
+                                          <p:val>
+                                            <p:strVal val="#ppt_y"/>
+                                          </p:val>
+                                        </p:tav>
+                                        <p:tav tm="100000">
+                                          <p:val>
+                                            <p:strVal val="#ppt_y"/>
+                                          </p:val>
+                                        </p:tav>
+                                      </p:tavLst>
+                                    </p:anim>
+                                  </p:childTnLst>
+                                </p:cTn>
+                              </p:par>
+                            </p:childTnLst>
+                          </p:cTn>
+                        </p:par>
+                      </p:childTnLst>
+                    </p:cTn>
+                  </p:par>
+                </p:childTnLst>
+              </p:cTn>
+              <p:prevCondLst>
+                <p:cond evt="onPrev" delay="0">
+                  <p:tgtEl>
+                    <p:sldTgt/>
+                  </p:tgtEl>
+                </p:cond>
+              </p:prevCondLst>
+              <p:nextCondLst>
+                <p:cond evt="onNext" delay="0">
+                  <p:tgtEl>
+                    <p:sldTgt/>
+                  </p:tgtEl>
+                </p:cond>
+              </p:nextCondLst>
+            </p:seq>
+          </p:childTnLst>
+        </p:cTn>
+      </p:par>
+    </p:tnLst>
+  </p:timing>
 </p:sld>
 </file>
 
@@ -7424,6 +7985,38 @@
           <a:chExt cx="0" cy="0"/>
         </a:xfrm>
       </p:grpSpPr>
+      <p:pic>
+        <p:nvPicPr>
+          <p:cNvPr id="4" name="Picture 2"/>
+          <p:cNvPicPr>
+            <a:picLocks noChangeAspect="1" noChangeArrowheads="1"/>
+          </p:cNvPicPr>
+          <p:nvPr/>
+        </p:nvPicPr>
+        <p:blipFill>
+          <a:blip r:embed="rId2" cstate="print"/>
+          <a:srcRect/>
+          <a:stretch>
+            <a:fillRect/>
+          </a:stretch>
+        </p:blipFill>
+        <p:spPr bwMode="auto">
+          <a:xfrm>
+            <a:off x="4067944" y="2708920"/>
+            <a:ext cx="4684190" cy="3168351"/>
+          </a:xfrm>
+          <a:prstGeom prst="rect">
+            <a:avLst/>
+          </a:prstGeom>
+          <a:noFill/>
+          <a:ln w="9525">
+            <a:noFill/>
+            <a:miter lim="800000"/>
+            <a:headEnd/>
+            <a:tailEnd/>
+          </a:ln>
+        </p:spPr>
+      </p:pic>
       <p:sp>
         <p:nvSpPr>
           <p:cNvPr id="2" name="Заголовок 1"/>
@@ -7515,7 +8108,7 @@
           <p:nvPr/>
         </p:nvPicPr>
         <p:blipFill>
-          <a:blip r:embed="rId2" cstate="print"/>
+          <a:blip r:embed="rId3" cstate="print"/>
           <a:srcRect/>
           <a:stretch>
             <a:fillRect/>
@@ -7525,41 +8118,6 @@
           <a:xfrm>
             <a:off x="323528" y="1628800"/>
             <a:ext cx="3168352" cy="4688180"/>
-          </a:xfrm>
-          <a:prstGeom prst="rect">
-            <a:avLst/>
-          </a:prstGeom>
-          <a:ln>
-            <a:noFill/>
-          </a:ln>
-          <a:effectLst>
-            <a:outerShdw blurRad="292100" dist="139700" dir="2700000" algn="tl" rotWithShape="0">
-              <a:srgbClr val="333333">
-                <a:alpha val="65000"/>
-              </a:srgbClr>
-            </a:outerShdw>
-          </a:effectLst>
-        </p:spPr>
-      </p:pic>
-      <p:pic>
-        <p:nvPicPr>
-          <p:cNvPr id="1027" name="Picture 3"/>
-          <p:cNvPicPr>
-            <a:picLocks noChangeAspect="1" noChangeArrowheads="1"/>
-          </p:cNvPicPr>
-          <p:nvPr/>
-        </p:nvPicPr>
-        <p:blipFill>
-          <a:blip r:embed="rId3" cstate="print"/>
-          <a:srcRect/>
-          <a:stretch>
-            <a:fillRect/>
-          </a:stretch>
-        </p:blipFill>
-        <p:spPr bwMode="auto">
-          <a:xfrm>
-            <a:off x="4067944" y="2492896"/>
-            <a:ext cx="4735072" cy="3600400"/>
           </a:xfrm>
           <a:prstGeom prst="rect">
             <a:avLst/>
@@ -7607,11 +8165,428 @@
           </a:p>
         </p:txBody>
       </p:sp>
+      <p:grpSp>
+        <p:nvGrpSpPr>
+          <p:cNvPr id="20" name="Группа 19"/>
+          <p:cNvGrpSpPr/>
+          <p:nvPr/>
+        </p:nvGrpSpPr>
+        <p:grpSpPr>
+          <a:xfrm>
+            <a:off x="4067944" y="2492896"/>
+            <a:ext cx="4968552" cy="3600400"/>
+            <a:chOff x="4067944" y="2492896"/>
+            <a:chExt cx="4968552" cy="3600400"/>
+          </a:xfrm>
+        </p:grpSpPr>
+        <p:pic>
+          <p:nvPicPr>
+            <p:cNvPr id="1027" name="Picture 3"/>
+            <p:cNvPicPr>
+              <a:picLocks noChangeAspect="1" noChangeArrowheads="1"/>
+            </p:cNvPicPr>
+            <p:nvPr/>
+          </p:nvPicPr>
+          <p:blipFill>
+            <a:blip r:embed="rId4" cstate="print"/>
+            <a:srcRect/>
+            <a:stretch>
+              <a:fillRect/>
+            </a:stretch>
+          </p:blipFill>
+          <p:spPr bwMode="auto">
+            <a:xfrm>
+              <a:off x="4067944" y="2492896"/>
+              <a:ext cx="4735072" cy="3600400"/>
+            </a:xfrm>
+            <a:prstGeom prst="rect">
+              <a:avLst/>
+            </a:prstGeom>
+            <a:ln>
+              <a:noFill/>
+            </a:ln>
+            <a:effectLst>
+              <a:outerShdw blurRad="292100" dist="139700" dir="2700000" algn="tl" rotWithShape="0">
+                <a:srgbClr val="333333">
+                  <a:alpha val="65000"/>
+                </a:srgbClr>
+              </a:outerShdw>
+            </a:effectLst>
+          </p:spPr>
+        </p:pic>
+        <p:grpSp>
+          <p:nvGrpSpPr>
+            <p:cNvPr id="10" name="Группа 9"/>
+            <p:cNvGrpSpPr/>
+            <p:nvPr/>
+          </p:nvGrpSpPr>
+          <p:grpSpPr>
+            <a:xfrm>
+              <a:off x="7092280" y="3140968"/>
+              <a:ext cx="1944216" cy="2376264"/>
+              <a:chOff x="8316416" y="3717032"/>
+              <a:chExt cx="432048" cy="1512168"/>
+            </a:xfrm>
+          </p:grpSpPr>
+          <p:grpSp>
+            <p:nvGrpSpPr>
+              <p:cNvPr id="11" name="Группа 21"/>
+              <p:cNvGrpSpPr/>
+              <p:nvPr/>
+            </p:nvGrpSpPr>
+            <p:grpSpPr>
+              <a:xfrm>
+                <a:off x="8460432" y="3717032"/>
+                <a:ext cx="288032" cy="1512168"/>
+                <a:chOff x="8460432" y="3717032"/>
+                <a:chExt cx="288032" cy="1512168"/>
+              </a:xfrm>
+            </p:grpSpPr>
+            <p:cxnSp>
+              <p:nvCxnSpPr>
+                <p:cNvPr id="13" name="Прямая соединительная линия 12"/>
+                <p:cNvCxnSpPr/>
+                <p:nvPr/>
+              </p:nvCxnSpPr>
+              <p:spPr>
+                <a:xfrm>
+                  <a:off x="8460432" y="5229200"/>
+                  <a:ext cx="288032" cy="0"/>
+                </a:xfrm>
+                <a:prstGeom prst="line">
+                  <a:avLst/>
+                </a:prstGeom>
+              </p:spPr>
+              <p:style>
+                <a:lnRef idx="1">
+                  <a:schemeClr val="accent1"/>
+                </a:lnRef>
+                <a:fillRef idx="0">
+                  <a:schemeClr val="accent1"/>
+                </a:fillRef>
+                <a:effectRef idx="0">
+                  <a:schemeClr val="accent1"/>
+                </a:effectRef>
+                <a:fontRef idx="minor">
+                  <a:schemeClr val="tx1"/>
+                </a:fontRef>
+              </p:style>
+            </p:cxnSp>
+            <p:cxnSp>
+              <p:nvCxnSpPr>
+                <p:cNvPr id="14" name="Прямая соединительная линия 13"/>
+                <p:cNvCxnSpPr/>
+                <p:nvPr/>
+              </p:nvCxnSpPr>
+              <p:spPr>
+                <a:xfrm flipV="1">
+                  <a:off x="8748464" y="3717032"/>
+                  <a:ext cx="0" cy="1512168"/>
+                </a:xfrm>
+                <a:prstGeom prst="line">
+                  <a:avLst/>
+                </a:prstGeom>
+              </p:spPr>
+              <p:style>
+                <a:lnRef idx="1">
+                  <a:schemeClr val="accent1"/>
+                </a:lnRef>
+                <a:fillRef idx="0">
+                  <a:schemeClr val="accent1"/>
+                </a:fillRef>
+                <a:effectRef idx="0">
+                  <a:schemeClr val="accent1"/>
+                </a:effectRef>
+                <a:fontRef idx="minor">
+                  <a:schemeClr val="tx1"/>
+                </a:fontRef>
+              </p:style>
+            </p:cxnSp>
+          </p:grpSp>
+          <p:cxnSp>
+            <p:nvCxnSpPr>
+              <p:cNvPr id="12" name="Прямая со стрелкой 11"/>
+              <p:cNvCxnSpPr/>
+              <p:nvPr/>
+            </p:nvCxnSpPr>
+            <p:spPr>
+              <a:xfrm flipH="1">
+                <a:off x="8316416" y="3717032"/>
+                <a:ext cx="432048" cy="0"/>
+              </a:xfrm>
+              <a:prstGeom prst="straightConnector1">
+                <a:avLst/>
+              </a:prstGeom>
+              <a:ln>
+                <a:tailEnd type="arrow"/>
+              </a:ln>
+            </p:spPr>
+            <p:style>
+              <a:lnRef idx="1">
+                <a:schemeClr val="accent1"/>
+              </a:lnRef>
+              <a:fillRef idx="0">
+                <a:schemeClr val="accent1"/>
+              </a:fillRef>
+              <a:effectRef idx="0">
+                <a:schemeClr val="accent1"/>
+              </a:effectRef>
+              <a:fontRef idx="minor">
+                <a:schemeClr val="tx1"/>
+              </a:fontRef>
+            </p:style>
+          </p:cxnSp>
+        </p:grpSp>
+        <p:grpSp>
+          <p:nvGrpSpPr>
+            <p:cNvPr id="15" name="Группа 14"/>
+            <p:cNvGrpSpPr/>
+            <p:nvPr/>
+          </p:nvGrpSpPr>
+          <p:grpSpPr>
+            <a:xfrm>
+              <a:off x="7092280" y="3140968"/>
+              <a:ext cx="1944216" cy="1656184"/>
+              <a:chOff x="8316416" y="3717032"/>
+              <a:chExt cx="432048" cy="1512168"/>
+            </a:xfrm>
+          </p:grpSpPr>
+          <p:grpSp>
+            <p:nvGrpSpPr>
+              <p:cNvPr id="16" name="Группа 21"/>
+              <p:cNvGrpSpPr/>
+              <p:nvPr/>
+            </p:nvGrpSpPr>
+            <p:grpSpPr>
+              <a:xfrm>
+                <a:off x="8460432" y="3717032"/>
+                <a:ext cx="288032" cy="1512168"/>
+                <a:chOff x="8460432" y="3717032"/>
+                <a:chExt cx="288032" cy="1512168"/>
+              </a:xfrm>
+            </p:grpSpPr>
+            <p:cxnSp>
+              <p:nvCxnSpPr>
+                <p:cNvPr id="18" name="Прямая соединительная линия 17"/>
+                <p:cNvCxnSpPr/>
+                <p:nvPr/>
+              </p:nvCxnSpPr>
+              <p:spPr>
+                <a:xfrm>
+                  <a:off x="8460432" y="5229200"/>
+                  <a:ext cx="288032" cy="0"/>
+                </a:xfrm>
+                <a:prstGeom prst="line">
+                  <a:avLst/>
+                </a:prstGeom>
+              </p:spPr>
+              <p:style>
+                <a:lnRef idx="1">
+                  <a:schemeClr val="accent1"/>
+                </a:lnRef>
+                <a:fillRef idx="0">
+                  <a:schemeClr val="accent1"/>
+                </a:fillRef>
+                <a:effectRef idx="0">
+                  <a:schemeClr val="accent1"/>
+                </a:effectRef>
+                <a:fontRef idx="minor">
+                  <a:schemeClr val="tx1"/>
+                </a:fontRef>
+              </p:style>
+            </p:cxnSp>
+            <p:cxnSp>
+              <p:nvCxnSpPr>
+                <p:cNvPr id="19" name="Прямая соединительная линия 18"/>
+                <p:cNvCxnSpPr/>
+                <p:nvPr/>
+              </p:nvCxnSpPr>
+              <p:spPr>
+                <a:xfrm flipV="1">
+                  <a:off x="8748464" y="3717032"/>
+                  <a:ext cx="0" cy="1512168"/>
+                </a:xfrm>
+                <a:prstGeom prst="line">
+                  <a:avLst/>
+                </a:prstGeom>
+              </p:spPr>
+              <p:style>
+                <a:lnRef idx="1">
+                  <a:schemeClr val="accent1"/>
+                </a:lnRef>
+                <a:fillRef idx="0">
+                  <a:schemeClr val="accent1"/>
+                </a:fillRef>
+                <a:effectRef idx="0">
+                  <a:schemeClr val="accent1"/>
+                </a:effectRef>
+                <a:fontRef idx="minor">
+                  <a:schemeClr val="tx1"/>
+                </a:fontRef>
+              </p:style>
+            </p:cxnSp>
+          </p:grpSp>
+          <p:cxnSp>
+            <p:nvCxnSpPr>
+              <p:cNvPr id="17" name="Прямая со стрелкой 16"/>
+              <p:cNvCxnSpPr/>
+              <p:nvPr/>
+            </p:nvCxnSpPr>
+            <p:spPr>
+              <a:xfrm flipH="1">
+                <a:off x="8316416" y="3717032"/>
+                <a:ext cx="432048" cy="0"/>
+              </a:xfrm>
+              <a:prstGeom prst="straightConnector1">
+                <a:avLst/>
+              </a:prstGeom>
+              <a:ln>
+                <a:tailEnd type="arrow"/>
+              </a:ln>
+            </p:spPr>
+            <p:style>
+              <a:lnRef idx="1">
+                <a:schemeClr val="accent1"/>
+              </a:lnRef>
+              <a:fillRef idx="0">
+                <a:schemeClr val="accent1"/>
+              </a:fillRef>
+              <a:effectRef idx="0">
+                <a:schemeClr val="accent1"/>
+              </a:effectRef>
+              <a:fontRef idx="minor">
+                <a:schemeClr val="tx1"/>
+              </a:fontRef>
+            </p:style>
+          </p:cxnSp>
+        </p:grpSp>
+      </p:grpSp>
     </p:spTree>
   </p:cSld>
   <p:clrMapOvr>
     <a:masterClrMapping/>
   </p:clrMapOvr>
+  <p:timing>
+    <p:tnLst>
+      <p:par>
+        <p:cTn id="1" dur="indefinite" restart="never" nodeType="tmRoot">
+          <p:childTnLst>
+            <p:seq concurrent="1" nextAc="seek">
+              <p:cTn id="2" dur="indefinite" nodeType="mainSeq">
+                <p:childTnLst>
+                  <p:par>
+                    <p:cTn id="3" fill="hold">
+                      <p:stCondLst>
+                        <p:cond delay="indefinite"/>
+                      </p:stCondLst>
+                      <p:childTnLst>
+                        <p:par>
+                          <p:cTn id="4" fill="hold">
+                            <p:stCondLst>
+                              <p:cond delay="0"/>
+                            </p:stCondLst>
+                            <p:childTnLst>
+                              <p:par>
+                                <p:cTn id="5" presetID="2" presetClass="entr" presetSubtype="2" fill="hold" nodeType="clickEffect">
+                                  <p:stCondLst>
+                                    <p:cond delay="0"/>
+                                  </p:stCondLst>
+                                  <p:childTnLst>
+                                    <p:set>
+                                      <p:cBhvr>
+                                        <p:cTn id="6" dur="1" fill="hold">
+                                          <p:stCondLst>
+                                            <p:cond delay="0"/>
+                                          </p:stCondLst>
+                                        </p:cTn>
+                                        <p:tgtEl>
+                                          <p:spTgt spid="20"/>
+                                        </p:tgtEl>
+                                        <p:attrNameLst>
+                                          <p:attrName>style.visibility</p:attrName>
+                                        </p:attrNameLst>
+                                      </p:cBhvr>
+                                      <p:to>
+                                        <p:strVal val="visible"/>
+                                      </p:to>
+                                    </p:set>
+                                    <p:anim calcmode="lin" valueType="num">
+                                      <p:cBhvr additive="base">
+                                        <p:cTn id="7" dur="500" fill="hold"/>
+                                        <p:tgtEl>
+                                          <p:spTgt spid="20"/>
+                                        </p:tgtEl>
+                                        <p:attrNameLst>
+                                          <p:attrName>ppt_x</p:attrName>
+                                        </p:attrNameLst>
+                                      </p:cBhvr>
+                                      <p:tavLst>
+                                        <p:tav tm="0">
+                                          <p:val>
+                                            <p:strVal val="1+#ppt_w/2"/>
+                                          </p:val>
+                                        </p:tav>
+                                        <p:tav tm="100000">
+                                          <p:val>
+                                            <p:strVal val="#ppt_x"/>
+                                          </p:val>
+                                        </p:tav>
+                                      </p:tavLst>
+                                    </p:anim>
+                                    <p:anim calcmode="lin" valueType="num">
+                                      <p:cBhvr additive="base">
+                                        <p:cTn id="8" dur="500" fill="hold"/>
+                                        <p:tgtEl>
+                                          <p:spTgt spid="20"/>
+                                        </p:tgtEl>
+                                        <p:attrNameLst>
+                                          <p:attrName>ppt_y</p:attrName>
+                                        </p:attrNameLst>
+                                      </p:cBhvr>
+                                      <p:tavLst>
+                                        <p:tav tm="0">
+                                          <p:val>
+                                            <p:strVal val="#ppt_y"/>
+                                          </p:val>
+                                        </p:tav>
+                                        <p:tav tm="100000">
+                                          <p:val>
+                                            <p:strVal val="#ppt_y"/>
+                                          </p:val>
+                                        </p:tav>
+                                      </p:tavLst>
+                                    </p:anim>
+                                  </p:childTnLst>
+                                </p:cTn>
+                              </p:par>
+                            </p:childTnLst>
+                          </p:cTn>
+                        </p:par>
+                      </p:childTnLst>
+                    </p:cTn>
+                  </p:par>
+                </p:childTnLst>
+              </p:cTn>
+              <p:prevCondLst>
+                <p:cond evt="onPrev" delay="0">
+                  <p:tgtEl>
+                    <p:sldTgt/>
+                  </p:tgtEl>
+                </p:cond>
+              </p:prevCondLst>
+              <p:nextCondLst>
+                <p:cond evt="onNext" delay="0">
+                  <p:tgtEl>
+                    <p:sldTgt/>
+                  </p:tgtEl>
+                </p:cond>
+              </p:nextCondLst>
+            </p:seq>
+          </p:childTnLst>
+        </p:cTn>
+      </p:par>
+    </p:tnLst>
+  </p:timing>
 </p:sld>
 </file>
 
@@ -7632,6 +8607,41 @@
           <a:chExt cx="0" cy="0"/>
         </a:xfrm>
       </p:grpSpPr>
+      <p:pic>
+        <p:nvPicPr>
+          <p:cNvPr id="4" name="Picture 2"/>
+          <p:cNvPicPr>
+            <a:picLocks noChangeAspect="1" noChangeArrowheads="1"/>
+          </p:cNvPicPr>
+          <p:nvPr/>
+        </p:nvPicPr>
+        <p:blipFill>
+          <a:blip r:embed="rId2" cstate="print"/>
+          <a:srcRect/>
+          <a:stretch>
+            <a:fillRect/>
+          </a:stretch>
+        </p:blipFill>
+        <p:spPr bwMode="auto">
+          <a:xfrm>
+            <a:off x="4860032" y="2996952"/>
+            <a:ext cx="3873320" cy="2808312"/>
+          </a:xfrm>
+          <a:prstGeom prst="rect">
+            <a:avLst/>
+          </a:prstGeom>
+          <a:ln>
+            <a:noFill/>
+          </a:ln>
+          <a:effectLst>
+            <a:outerShdw blurRad="292100" dist="139700" dir="2700000" algn="tl" rotWithShape="0">
+              <a:srgbClr val="333333">
+                <a:alpha val="65000"/>
+              </a:srgbClr>
+            </a:outerShdw>
+          </a:effectLst>
+        </p:spPr>
+      </p:pic>
       <p:sp>
         <p:nvSpPr>
           <p:cNvPr id="2" name="Заголовок 1"/>
@@ -7722,7 +8732,7 @@
           <p:nvPr/>
         </p:nvPicPr>
         <p:blipFill>
-          <a:blip r:embed="rId2" cstate="print"/>
+          <a:blip r:embed="rId3" cstate="print"/>
           <a:srcRect/>
           <a:stretch>
             <a:fillRect/>
@@ -7732,41 +8742,6 @@
           <a:xfrm>
             <a:off x="395536" y="1916832"/>
             <a:ext cx="4074262" cy="4572744"/>
-          </a:xfrm>
-          <a:prstGeom prst="rect">
-            <a:avLst/>
-          </a:prstGeom>
-          <a:ln>
-            <a:noFill/>
-          </a:ln>
-          <a:effectLst>
-            <a:outerShdw blurRad="292100" dist="139700" dir="2700000" algn="tl" rotWithShape="0">
-              <a:srgbClr val="333333">
-                <a:alpha val="65000"/>
-              </a:srgbClr>
-            </a:outerShdw>
-          </a:effectLst>
-        </p:spPr>
-      </p:pic>
-      <p:pic>
-        <p:nvPicPr>
-          <p:cNvPr id="2051" name="Picture 3"/>
-          <p:cNvPicPr>
-            <a:picLocks noChangeAspect="1" noChangeArrowheads="1"/>
-          </p:cNvPicPr>
-          <p:nvPr/>
-        </p:nvPicPr>
-        <p:blipFill>
-          <a:blip r:embed="rId3" cstate="print"/>
-          <a:srcRect/>
-          <a:stretch>
-            <a:fillRect/>
-          </a:stretch>
-        </p:blipFill>
-        <p:spPr bwMode="auto">
-          <a:xfrm>
-            <a:off x="5004048" y="2924944"/>
-            <a:ext cx="3514725" cy="3009900"/>
           </a:xfrm>
           <a:prstGeom prst="rect">
             <a:avLst/>
@@ -7819,11 +8794,378 @@
           </a:p>
         </p:txBody>
       </p:sp>
+      <p:grpSp>
+        <p:nvGrpSpPr>
+          <p:cNvPr id="12" name="Группа 11"/>
+          <p:cNvGrpSpPr/>
+          <p:nvPr/>
+        </p:nvGrpSpPr>
+        <p:grpSpPr>
+          <a:xfrm>
+            <a:off x="5004048" y="2924944"/>
+            <a:ext cx="3816424" cy="3009900"/>
+            <a:chOff x="5004048" y="2924944"/>
+            <a:chExt cx="3816424" cy="3009900"/>
+          </a:xfrm>
+        </p:grpSpPr>
+        <p:pic>
+          <p:nvPicPr>
+            <p:cNvPr id="2051" name="Picture 3"/>
+            <p:cNvPicPr>
+              <a:picLocks noChangeAspect="1" noChangeArrowheads="1"/>
+            </p:cNvPicPr>
+            <p:nvPr/>
+          </p:nvPicPr>
+          <p:blipFill>
+            <a:blip r:embed="rId4" cstate="print"/>
+            <a:srcRect/>
+            <a:stretch>
+              <a:fillRect/>
+            </a:stretch>
+          </p:blipFill>
+          <p:spPr bwMode="auto">
+            <a:xfrm>
+              <a:off x="5004048" y="2924944"/>
+              <a:ext cx="3514725" cy="3009900"/>
+            </a:xfrm>
+            <a:prstGeom prst="rect">
+              <a:avLst/>
+            </a:prstGeom>
+            <a:ln>
+              <a:noFill/>
+            </a:ln>
+            <a:effectLst>
+              <a:outerShdw blurRad="292100" dist="139700" dir="2700000" algn="tl" rotWithShape="0">
+                <a:srgbClr val="333333">
+                  <a:alpha val="65000"/>
+                </a:srgbClr>
+              </a:outerShdw>
+            </a:effectLst>
+          </p:spPr>
+        </p:pic>
+        <p:grpSp>
+          <p:nvGrpSpPr>
+            <p:cNvPr id="7" name="Группа 6"/>
+            <p:cNvGrpSpPr/>
+            <p:nvPr/>
+          </p:nvGrpSpPr>
+          <p:grpSpPr>
+            <a:xfrm>
+              <a:off x="8388424" y="3717032"/>
+              <a:ext cx="432048" cy="1584176"/>
+              <a:chOff x="8316416" y="3717032"/>
+              <a:chExt cx="432048" cy="1512168"/>
+            </a:xfrm>
+          </p:grpSpPr>
+          <p:grpSp>
+            <p:nvGrpSpPr>
+              <p:cNvPr id="8" name="Группа 21"/>
+              <p:cNvGrpSpPr/>
+              <p:nvPr/>
+            </p:nvGrpSpPr>
+            <p:grpSpPr>
+              <a:xfrm>
+                <a:off x="8460432" y="3717032"/>
+                <a:ext cx="288032" cy="1512168"/>
+                <a:chOff x="8460432" y="3717032"/>
+                <a:chExt cx="288032" cy="1512168"/>
+              </a:xfrm>
+            </p:grpSpPr>
+            <p:cxnSp>
+              <p:nvCxnSpPr>
+                <p:cNvPr id="10" name="Прямая соединительная линия 9"/>
+                <p:cNvCxnSpPr/>
+                <p:nvPr/>
+              </p:nvCxnSpPr>
+              <p:spPr>
+                <a:xfrm>
+                  <a:off x="8460432" y="5229200"/>
+                  <a:ext cx="288032" cy="0"/>
+                </a:xfrm>
+                <a:prstGeom prst="line">
+                  <a:avLst/>
+                </a:prstGeom>
+              </p:spPr>
+              <p:style>
+                <a:lnRef idx="1">
+                  <a:schemeClr val="accent1"/>
+                </a:lnRef>
+                <a:fillRef idx="0">
+                  <a:schemeClr val="accent1"/>
+                </a:fillRef>
+                <a:effectRef idx="0">
+                  <a:schemeClr val="accent1"/>
+                </a:effectRef>
+                <a:fontRef idx="minor">
+                  <a:schemeClr val="tx1"/>
+                </a:fontRef>
+              </p:style>
+            </p:cxnSp>
+            <p:cxnSp>
+              <p:nvCxnSpPr>
+                <p:cNvPr id="11" name="Прямая соединительная линия 10"/>
+                <p:cNvCxnSpPr/>
+                <p:nvPr/>
+              </p:nvCxnSpPr>
+              <p:spPr>
+                <a:xfrm flipV="1">
+                  <a:off x="8748464" y="3717032"/>
+                  <a:ext cx="0" cy="1512168"/>
+                </a:xfrm>
+                <a:prstGeom prst="line">
+                  <a:avLst/>
+                </a:prstGeom>
+              </p:spPr>
+              <p:style>
+                <a:lnRef idx="1">
+                  <a:schemeClr val="accent1"/>
+                </a:lnRef>
+                <a:fillRef idx="0">
+                  <a:schemeClr val="accent1"/>
+                </a:fillRef>
+                <a:effectRef idx="0">
+                  <a:schemeClr val="accent1"/>
+                </a:effectRef>
+                <a:fontRef idx="minor">
+                  <a:schemeClr val="tx1"/>
+                </a:fontRef>
+              </p:style>
+            </p:cxnSp>
+          </p:grpSp>
+          <p:cxnSp>
+            <p:nvCxnSpPr>
+              <p:cNvPr id="9" name="Прямая со стрелкой 8"/>
+              <p:cNvCxnSpPr/>
+              <p:nvPr/>
+            </p:nvCxnSpPr>
+            <p:spPr>
+              <a:xfrm flipH="1">
+                <a:off x="8316416" y="3717032"/>
+                <a:ext cx="432048" cy="0"/>
+              </a:xfrm>
+              <a:prstGeom prst="straightConnector1">
+                <a:avLst/>
+              </a:prstGeom>
+              <a:ln>
+                <a:tailEnd type="arrow"/>
+              </a:ln>
+            </p:spPr>
+            <p:style>
+              <a:lnRef idx="1">
+                <a:schemeClr val="accent1"/>
+              </a:lnRef>
+              <a:fillRef idx="0">
+                <a:schemeClr val="accent1"/>
+              </a:fillRef>
+              <a:effectRef idx="0">
+                <a:schemeClr val="accent1"/>
+              </a:effectRef>
+              <a:fontRef idx="minor">
+                <a:schemeClr val="tx1"/>
+              </a:fontRef>
+            </p:style>
+          </p:cxnSp>
+        </p:grpSp>
+      </p:grpSp>
     </p:spTree>
   </p:cSld>
   <p:clrMapOvr>
     <a:masterClrMapping/>
   </p:clrMapOvr>
+  <p:timing>
+    <p:tnLst>
+      <p:par>
+        <p:cTn id="1" dur="indefinite" restart="never" nodeType="tmRoot">
+          <p:childTnLst>
+            <p:seq concurrent="1" nextAc="seek">
+              <p:cTn id="2" dur="indefinite" nodeType="mainSeq">
+                <p:childTnLst>
+                  <p:par>
+                    <p:cTn id="3" fill="hold">
+                      <p:stCondLst>
+                        <p:cond delay="indefinite"/>
+                      </p:stCondLst>
+                      <p:childTnLst>
+                        <p:par>
+                          <p:cTn id="4" fill="hold">
+                            <p:stCondLst>
+                              <p:cond delay="0"/>
+                            </p:stCondLst>
+                            <p:childTnLst>
+                              <p:par>
+                                <p:cTn id="5" presetID="2" presetClass="exit" presetSubtype="2" fill="hold" nodeType="clickEffect">
+                                  <p:stCondLst>
+                                    <p:cond delay="0"/>
+                                  </p:stCondLst>
+                                  <p:childTnLst>
+                                    <p:anim calcmode="lin" valueType="num">
+                                      <p:cBhvr additive="base">
+                                        <p:cTn id="6" dur="500"/>
+                                        <p:tgtEl>
+                                          <p:spTgt spid="4"/>
+                                        </p:tgtEl>
+                                        <p:attrNameLst>
+                                          <p:attrName>ppt_x</p:attrName>
+                                        </p:attrNameLst>
+                                      </p:cBhvr>
+                                      <p:tavLst>
+                                        <p:tav tm="0">
+                                          <p:val>
+                                            <p:strVal val="ppt_x"/>
+                                          </p:val>
+                                        </p:tav>
+                                        <p:tav tm="100000">
+                                          <p:val>
+                                            <p:strVal val="1+ppt_w/2"/>
+                                          </p:val>
+                                        </p:tav>
+                                      </p:tavLst>
+                                    </p:anim>
+                                    <p:anim calcmode="lin" valueType="num">
+                                      <p:cBhvr additive="base">
+                                        <p:cTn id="7" dur="500"/>
+                                        <p:tgtEl>
+                                          <p:spTgt spid="4"/>
+                                        </p:tgtEl>
+                                        <p:attrNameLst>
+                                          <p:attrName>ppt_y</p:attrName>
+                                        </p:attrNameLst>
+                                      </p:cBhvr>
+                                      <p:tavLst>
+                                        <p:tav tm="0">
+                                          <p:val>
+                                            <p:strVal val="ppt_y"/>
+                                          </p:val>
+                                        </p:tav>
+                                        <p:tav tm="100000">
+                                          <p:val>
+                                            <p:strVal val="ppt_y"/>
+                                          </p:val>
+                                        </p:tav>
+                                      </p:tavLst>
+                                    </p:anim>
+                                    <p:set>
+                                      <p:cBhvr>
+                                        <p:cTn id="8" dur="1" fill="hold">
+                                          <p:stCondLst>
+                                            <p:cond delay="499"/>
+                                          </p:stCondLst>
+                                        </p:cTn>
+                                        <p:tgtEl>
+                                          <p:spTgt spid="4"/>
+                                        </p:tgtEl>
+                                        <p:attrNameLst>
+                                          <p:attrName>style.visibility</p:attrName>
+                                        </p:attrNameLst>
+                                      </p:cBhvr>
+                                      <p:to>
+                                        <p:strVal val="hidden"/>
+                                      </p:to>
+                                    </p:set>
+                                  </p:childTnLst>
+                                </p:cTn>
+                              </p:par>
+                              <p:par>
+                                <p:cTn id="9" presetID="2" presetClass="entr" presetSubtype="2" fill="hold" nodeType="withEffect">
+                                  <p:stCondLst>
+                                    <p:cond delay="0"/>
+                                  </p:stCondLst>
+                                  <p:childTnLst>
+                                    <p:set>
+                                      <p:cBhvr>
+                                        <p:cTn id="10" dur="1" fill="hold">
+                                          <p:stCondLst>
+                                            <p:cond delay="0"/>
+                                          </p:stCondLst>
+                                        </p:cTn>
+                                        <p:tgtEl>
+                                          <p:spTgt spid="12"/>
+                                        </p:tgtEl>
+                                        <p:attrNameLst>
+                                          <p:attrName>style.visibility</p:attrName>
+                                        </p:attrNameLst>
+                                      </p:cBhvr>
+                                      <p:to>
+                                        <p:strVal val="visible"/>
+                                      </p:to>
+                                    </p:set>
+                                    <p:anim calcmode="lin" valueType="num">
+                                      <p:cBhvr additive="base">
+                                        <p:cTn id="11" dur="500" fill="hold"/>
+                                        <p:tgtEl>
+                                          <p:spTgt spid="12"/>
+                                        </p:tgtEl>
+                                        <p:attrNameLst>
+                                          <p:attrName>ppt_x</p:attrName>
+                                        </p:attrNameLst>
+                                      </p:cBhvr>
+                                      <p:tavLst>
+                                        <p:tav tm="0">
+                                          <p:val>
+                                            <p:strVal val="1+#ppt_w/2"/>
+                                          </p:val>
+                                        </p:tav>
+                                        <p:tav tm="100000">
+                                          <p:val>
+                                            <p:strVal val="#ppt_x"/>
+                                          </p:val>
+                                        </p:tav>
+                                      </p:tavLst>
+                                    </p:anim>
+                                    <p:anim calcmode="lin" valueType="num">
+                                      <p:cBhvr additive="base">
+                                        <p:cTn id="12" dur="500" fill="hold"/>
+                                        <p:tgtEl>
+                                          <p:spTgt spid="12"/>
+                                        </p:tgtEl>
+                                        <p:attrNameLst>
+                                          <p:attrName>ppt_y</p:attrName>
+                                        </p:attrNameLst>
+                                      </p:cBhvr>
+                                      <p:tavLst>
+                                        <p:tav tm="0">
+                                          <p:val>
+                                            <p:strVal val="#ppt_y"/>
+                                          </p:val>
+                                        </p:tav>
+                                        <p:tav tm="100000">
+                                          <p:val>
+                                            <p:strVal val="#ppt_y"/>
+                                          </p:val>
+                                        </p:tav>
+                                      </p:tavLst>
+                                    </p:anim>
+                                  </p:childTnLst>
+                                </p:cTn>
+                              </p:par>
+                            </p:childTnLst>
+                          </p:cTn>
+                        </p:par>
+                      </p:childTnLst>
+                    </p:cTn>
+                  </p:par>
+                </p:childTnLst>
+              </p:cTn>
+              <p:prevCondLst>
+                <p:cond evt="onPrev" delay="0">
+                  <p:tgtEl>
+                    <p:sldTgt/>
+                  </p:tgtEl>
+                </p:cond>
+              </p:prevCondLst>
+              <p:nextCondLst>
+                <p:cond evt="onNext" delay="0">
+                  <p:tgtEl>
+                    <p:sldTgt/>
+                  </p:tgtEl>
+                </p:cond>
+              </p:nextCondLst>
+            </p:seq>
+          </p:childTnLst>
+        </p:cTn>
+      </p:par>
+    </p:tnLst>
+  </p:timing>
 </p:sld>
 </file>
 
@@ -7986,6 +9328,13 @@
   <p:clrMapOvr>
     <a:masterClrMapping/>
   </p:clrMapOvr>
+  <p:timing>
+    <p:tnLst>
+      <p:par>
+        <p:cTn id="1" dur="indefinite" restart="never" nodeType="tmRoot"/>
+      </p:par>
+    </p:tnLst>
+  </p:timing>
 </p:sld>
 </file>
 

</xml_diff>